<commit_message>
Create scenes and add training weeks in brainstorming file
</commit_message>
<xml_diff>
--- a/Documents/Brainstorming.pptx
+++ b/Documents/Brainstorming.pptx
@@ -3585,13 +3585,13 @@
           <a:p>
             <a:r>
               <a:rPr lang="fr-FR" dirty="0"/>
-              <a:t>…</a:t>
+              <a:t>Intensité</a:t>
             </a:r>
           </a:p>
           <a:p>
             <a:r>
               <a:rPr lang="fr-FR" dirty="0"/>
-              <a:t>…</a:t>
+              <a:t>Affutage</a:t>
             </a:r>
           </a:p>
         </p:txBody>

</xml_diff>

<commit_message>
Create the Back button image
</commit_message>
<xml_diff>
--- a/Documents/Brainstorming.pptx
+++ b/Documents/Brainstorming.pptx
@@ -261,7 +261,7 @@
           <a:p>
             <a:fld id="{FAC533C7-ED63-4344-B326-4F3AD794C492}" type="datetimeFigureOut">
               <a:rPr lang="fr-FR" smtClean="0"/>
-              <a:t>06/07/2021</a:t>
+              <a:t>07/07/2021</a:t>
             </a:fld>
             <a:endParaRPr lang="fr-FR"/>
           </a:p>
@@ -459,7 +459,7 @@
           <a:p>
             <a:fld id="{FAC533C7-ED63-4344-B326-4F3AD794C492}" type="datetimeFigureOut">
               <a:rPr lang="fr-FR" smtClean="0"/>
-              <a:t>06/07/2021</a:t>
+              <a:t>07/07/2021</a:t>
             </a:fld>
             <a:endParaRPr lang="fr-FR"/>
           </a:p>
@@ -667,7 +667,7 @@
           <a:p>
             <a:fld id="{FAC533C7-ED63-4344-B326-4F3AD794C492}" type="datetimeFigureOut">
               <a:rPr lang="fr-FR" smtClean="0"/>
-              <a:t>06/07/2021</a:t>
+              <a:t>07/07/2021</a:t>
             </a:fld>
             <a:endParaRPr lang="fr-FR"/>
           </a:p>
@@ -865,7 +865,7 @@
           <a:p>
             <a:fld id="{FAC533C7-ED63-4344-B326-4F3AD794C492}" type="datetimeFigureOut">
               <a:rPr lang="fr-FR" smtClean="0"/>
-              <a:t>06/07/2021</a:t>
+              <a:t>07/07/2021</a:t>
             </a:fld>
             <a:endParaRPr lang="fr-FR"/>
           </a:p>
@@ -1140,7 +1140,7 @@
           <a:p>
             <a:fld id="{FAC533C7-ED63-4344-B326-4F3AD794C492}" type="datetimeFigureOut">
               <a:rPr lang="fr-FR" smtClean="0"/>
-              <a:t>06/07/2021</a:t>
+              <a:t>07/07/2021</a:t>
             </a:fld>
             <a:endParaRPr lang="fr-FR"/>
           </a:p>
@@ -1405,7 +1405,7 @@
           <a:p>
             <a:fld id="{FAC533C7-ED63-4344-B326-4F3AD794C492}" type="datetimeFigureOut">
               <a:rPr lang="fr-FR" smtClean="0"/>
-              <a:t>06/07/2021</a:t>
+              <a:t>07/07/2021</a:t>
             </a:fld>
             <a:endParaRPr lang="fr-FR"/>
           </a:p>
@@ -1817,7 +1817,7 @@
           <a:p>
             <a:fld id="{FAC533C7-ED63-4344-B326-4F3AD794C492}" type="datetimeFigureOut">
               <a:rPr lang="fr-FR" smtClean="0"/>
-              <a:t>06/07/2021</a:t>
+              <a:t>07/07/2021</a:t>
             </a:fld>
             <a:endParaRPr lang="fr-FR"/>
           </a:p>
@@ -1958,7 +1958,7 @@
           <a:p>
             <a:fld id="{FAC533C7-ED63-4344-B326-4F3AD794C492}" type="datetimeFigureOut">
               <a:rPr lang="fr-FR" smtClean="0"/>
-              <a:t>06/07/2021</a:t>
+              <a:t>07/07/2021</a:t>
             </a:fld>
             <a:endParaRPr lang="fr-FR"/>
           </a:p>
@@ -2071,7 +2071,7 @@
           <a:p>
             <a:fld id="{FAC533C7-ED63-4344-B326-4F3AD794C492}" type="datetimeFigureOut">
               <a:rPr lang="fr-FR" smtClean="0"/>
-              <a:t>06/07/2021</a:t>
+              <a:t>07/07/2021</a:t>
             </a:fld>
             <a:endParaRPr lang="fr-FR"/>
           </a:p>
@@ -2382,7 +2382,7 @@
           <a:p>
             <a:fld id="{FAC533C7-ED63-4344-B326-4F3AD794C492}" type="datetimeFigureOut">
               <a:rPr lang="fr-FR" smtClean="0"/>
-              <a:t>06/07/2021</a:t>
+              <a:t>07/07/2021</a:t>
             </a:fld>
             <a:endParaRPr lang="fr-FR"/>
           </a:p>
@@ -2670,7 +2670,7 @@
           <a:p>
             <a:fld id="{FAC533C7-ED63-4344-B326-4F3AD794C492}" type="datetimeFigureOut">
               <a:rPr lang="fr-FR" smtClean="0"/>
-              <a:t>06/07/2021</a:t>
+              <a:t>07/07/2021</a:t>
             </a:fld>
             <a:endParaRPr lang="fr-FR"/>
           </a:p>
@@ -2911,7 +2911,7 @@
           <a:p>
             <a:fld id="{FAC533C7-ED63-4344-B326-4F3AD794C492}" type="datetimeFigureOut">
               <a:rPr lang="fr-FR" smtClean="0"/>
-              <a:t>06/07/2021</a:t>
+              <a:t>07/07/2021</a:t>
             </a:fld>
             <a:endParaRPr lang="fr-FR"/>
           </a:p>
@@ -3795,6 +3795,275 @@
           </a:p>
         </p:txBody>
       </p:sp>
+      <p:grpSp>
+        <p:nvGrpSpPr>
+          <p:cNvPr id="3" name="Groupe 2">
+            <a:extLst>
+              <a:ext uri="{FF2B5EF4-FFF2-40B4-BE49-F238E27FC236}">
+                <a16:creationId xmlns:a16="http://schemas.microsoft.com/office/drawing/2014/main" id="{624745F5-D7E4-478E-AA24-B04EF9CA23A4}"/>
+              </a:ext>
+            </a:extLst>
+          </p:cNvPr>
+          <p:cNvGrpSpPr/>
+          <p:nvPr/>
+        </p:nvGrpSpPr>
+        <p:grpSpPr>
+          <a:xfrm>
+            <a:off x="3274560" y="3565998"/>
+            <a:ext cx="1899822" cy="1065320"/>
+            <a:chOff x="3274560" y="3565998"/>
+            <a:chExt cx="1899822" cy="1065320"/>
+          </a:xfrm>
+        </p:grpSpPr>
+        <p:sp>
+          <p:nvSpPr>
+            <p:cNvPr id="6" name="Rectangle : coins arrondis 5">
+              <a:extLst>
+                <a:ext uri="{FF2B5EF4-FFF2-40B4-BE49-F238E27FC236}">
+                  <a16:creationId xmlns:a16="http://schemas.microsoft.com/office/drawing/2014/main" id="{7B84FBC1-6CC4-4A16-A81B-E10FF123C073}"/>
+                </a:ext>
+              </a:extLst>
+            </p:cNvPr>
+            <p:cNvSpPr/>
+            <p:nvPr/>
+          </p:nvSpPr>
+          <p:spPr>
+            <a:xfrm>
+              <a:off x="3274560" y="3565998"/>
+              <a:ext cx="1899822" cy="1065320"/>
+            </a:xfrm>
+            <a:prstGeom prst="roundRect">
+              <a:avLst/>
+            </a:prstGeom>
+            <a:solidFill>
+              <a:schemeClr val="accent2"/>
+            </a:solidFill>
+            <a:ln w="57150">
+              <a:solidFill>
+                <a:schemeClr val="accent2">
+                  <a:lumMod val="50000"/>
+                </a:schemeClr>
+              </a:solidFill>
+            </a:ln>
+            <a:effectLst/>
+            <a:scene3d>
+              <a:camera prst="orthographicFront"/>
+              <a:lightRig rig="threePt" dir="t"/>
+            </a:scene3d>
+            <a:sp3d>
+              <a:bevelT w="101600" h="101600"/>
+            </a:sp3d>
+          </p:spPr>
+          <p:style>
+            <a:lnRef idx="2">
+              <a:schemeClr val="accent1">
+                <a:shade val="50000"/>
+              </a:schemeClr>
+            </a:lnRef>
+            <a:fillRef idx="1">
+              <a:schemeClr val="accent1"/>
+            </a:fillRef>
+            <a:effectRef idx="0">
+              <a:schemeClr val="accent1"/>
+            </a:effectRef>
+            <a:fontRef idx="minor">
+              <a:schemeClr val="lt1"/>
+            </a:fontRef>
+          </p:style>
+          <p:txBody>
+            <a:bodyPr rtlCol="0" anchor="ctr"/>
+            <a:lstStyle/>
+            <a:p>
+              <a:pPr algn="ctr"/>
+              <a:endParaRPr lang="fr-FR"/>
+            </a:p>
+          </p:txBody>
+        </p:sp>
+        <p:sp>
+          <p:nvSpPr>
+            <p:cNvPr id="2" name="Flèche : droite 1">
+              <a:extLst>
+                <a:ext uri="{FF2B5EF4-FFF2-40B4-BE49-F238E27FC236}">
+                  <a16:creationId xmlns:a16="http://schemas.microsoft.com/office/drawing/2014/main" id="{C7021A2B-80A6-488E-93CF-CB90231CDDF9}"/>
+                </a:ext>
+              </a:extLst>
+            </p:cNvPr>
+            <p:cNvSpPr/>
+            <p:nvPr/>
+          </p:nvSpPr>
+          <p:spPr>
+            <a:xfrm rot="10800000">
+              <a:off x="3799598" y="3832753"/>
+              <a:ext cx="849745" cy="531810"/>
+            </a:xfrm>
+            <a:prstGeom prst="rightArrow">
+              <a:avLst/>
+            </a:prstGeom>
+          </p:spPr>
+          <p:style>
+            <a:lnRef idx="2">
+              <a:schemeClr val="dk1">
+                <a:shade val="50000"/>
+              </a:schemeClr>
+            </a:lnRef>
+            <a:fillRef idx="1">
+              <a:schemeClr val="dk1"/>
+            </a:fillRef>
+            <a:effectRef idx="0">
+              <a:schemeClr val="dk1"/>
+            </a:effectRef>
+            <a:fontRef idx="minor">
+              <a:schemeClr val="lt1"/>
+            </a:fontRef>
+          </p:style>
+          <p:txBody>
+            <a:bodyPr rtlCol="0" anchor="ctr"/>
+            <a:lstStyle/>
+            <a:p>
+              <a:pPr algn="ctr"/>
+              <a:endParaRPr lang="fr-FR"/>
+            </a:p>
+          </p:txBody>
+        </p:sp>
+      </p:grpSp>
+      <p:grpSp>
+        <p:nvGrpSpPr>
+          <p:cNvPr id="8" name="Groupe 7">
+            <a:extLst>
+              <a:ext uri="{FF2B5EF4-FFF2-40B4-BE49-F238E27FC236}">
+                <a16:creationId xmlns:a16="http://schemas.microsoft.com/office/drawing/2014/main" id="{464B18BA-66DD-4DD8-8A54-71A6E1C705C4}"/>
+              </a:ext>
+            </a:extLst>
+          </p:cNvPr>
+          <p:cNvGrpSpPr/>
+          <p:nvPr/>
+        </p:nvGrpSpPr>
+        <p:grpSpPr>
+          <a:xfrm>
+            <a:off x="5699419" y="3565998"/>
+            <a:ext cx="1899822" cy="1065320"/>
+            <a:chOff x="3274560" y="3565998"/>
+            <a:chExt cx="1899822" cy="1065320"/>
+          </a:xfrm>
+        </p:grpSpPr>
+        <p:sp>
+          <p:nvSpPr>
+            <p:cNvPr id="9" name="Rectangle : coins arrondis 8">
+              <a:extLst>
+                <a:ext uri="{FF2B5EF4-FFF2-40B4-BE49-F238E27FC236}">
+                  <a16:creationId xmlns:a16="http://schemas.microsoft.com/office/drawing/2014/main" id="{D31C2AE7-6AEA-4A9F-B8D9-8807DDB700BA}"/>
+                </a:ext>
+              </a:extLst>
+            </p:cNvPr>
+            <p:cNvSpPr/>
+            <p:nvPr/>
+          </p:nvSpPr>
+          <p:spPr>
+            <a:xfrm>
+              <a:off x="3274560" y="3565998"/>
+              <a:ext cx="1899822" cy="1065320"/>
+            </a:xfrm>
+            <a:prstGeom prst="roundRect">
+              <a:avLst/>
+            </a:prstGeom>
+            <a:solidFill>
+              <a:schemeClr val="accent2"/>
+            </a:solidFill>
+            <a:ln w="57150">
+              <a:solidFill>
+                <a:schemeClr val="accent2">
+                  <a:lumMod val="50000"/>
+                </a:schemeClr>
+              </a:solidFill>
+            </a:ln>
+            <a:effectLst/>
+            <a:scene3d>
+              <a:camera prst="orthographicFront"/>
+              <a:lightRig rig="threePt" dir="t"/>
+            </a:scene3d>
+            <a:sp3d>
+              <a:bevelT w="101600" h="101600" prst="relaxedInset"/>
+            </a:sp3d>
+          </p:spPr>
+          <p:style>
+            <a:lnRef idx="2">
+              <a:schemeClr val="accent1">
+                <a:shade val="50000"/>
+              </a:schemeClr>
+            </a:lnRef>
+            <a:fillRef idx="1">
+              <a:schemeClr val="accent1"/>
+            </a:fillRef>
+            <a:effectRef idx="0">
+              <a:schemeClr val="accent1"/>
+            </a:effectRef>
+            <a:fontRef idx="minor">
+              <a:schemeClr val="lt1"/>
+            </a:fontRef>
+          </p:style>
+          <p:txBody>
+            <a:bodyPr rtlCol="0" anchor="ctr"/>
+            <a:lstStyle/>
+            <a:p>
+              <a:pPr algn="ctr"/>
+              <a:endParaRPr lang="fr-FR"/>
+            </a:p>
+          </p:txBody>
+        </p:sp>
+        <p:sp>
+          <p:nvSpPr>
+            <p:cNvPr id="10" name="Flèche : droite 9">
+              <a:extLst>
+                <a:ext uri="{FF2B5EF4-FFF2-40B4-BE49-F238E27FC236}">
+                  <a16:creationId xmlns:a16="http://schemas.microsoft.com/office/drawing/2014/main" id="{F3A9C242-BB9D-446D-8A36-646582E73AB8}"/>
+                </a:ext>
+              </a:extLst>
+            </p:cNvPr>
+            <p:cNvSpPr/>
+            <p:nvPr/>
+          </p:nvSpPr>
+          <p:spPr>
+            <a:xfrm rot="10800000">
+              <a:off x="3799598" y="3832753"/>
+              <a:ext cx="849745" cy="531810"/>
+            </a:xfrm>
+            <a:prstGeom prst="rightArrow">
+              <a:avLst/>
+            </a:prstGeom>
+            <a:scene3d>
+              <a:camera prst="orthographicFront"/>
+              <a:lightRig rig="threePt" dir="t"/>
+            </a:scene3d>
+            <a:sp3d>
+              <a:bevelT prst="relaxedInset"/>
+            </a:sp3d>
+          </p:spPr>
+          <p:style>
+            <a:lnRef idx="2">
+              <a:schemeClr val="dk1">
+                <a:shade val="50000"/>
+              </a:schemeClr>
+            </a:lnRef>
+            <a:fillRef idx="1">
+              <a:schemeClr val="dk1"/>
+            </a:fillRef>
+            <a:effectRef idx="0">
+              <a:schemeClr val="dk1"/>
+            </a:effectRef>
+            <a:fontRef idx="minor">
+              <a:schemeClr val="lt1"/>
+            </a:fontRef>
+          </p:style>
+          <p:txBody>
+            <a:bodyPr rtlCol="0" anchor="ctr"/>
+            <a:lstStyle/>
+            <a:p>
+              <a:pPr algn="ctr"/>
+              <a:endParaRPr lang="fr-FR"/>
+            </a:p>
+          </p:txBody>
+        </p:sp>
+      </p:grpSp>
     </p:spTree>
     <p:extLst>
       <p:ext uri="{BB962C8B-B14F-4D97-AF65-F5344CB8AC3E}">

</xml_diff>

<commit_message>
Create Small calendar prefab and its manager
</commit_message>
<xml_diff>
--- a/Documents/Brainstorming.pptx
+++ b/Documents/Brainstorming.pptx
@@ -3921,7 +3921,7 @@
             <a:lstStyle/>
             <a:p>
               <a:pPr algn="ctr"/>
-              <a:endParaRPr lang="fr-FR"/>
+              <a:endParaRPr lang="fr-FR" dirty="0"/>
             </a:p>
           </p:txBody>
         </p:sp>
@@ -4049,6 +4049,973 @@
             </a:fillRef>
             <a:effectRef idx="0">
               <a:schemeClr val="dk1"/>
+            </a:effectRef>
+            <a:fontRef idx="minor">
+              <a:schemeClr val="lt1"/>
+            </a:fontRef>
+          </p:style>
+          <p:txBody>
+            <a:bodyPr rtlCol="0" anchor="ctr"/>
+            <a:lstStyle/>
+            <a:p>
+              <a:pPr algn="ctr"/>
+              <a:endParaRPr lang="fr-FR"/>
+            </a:p>
+          </p:txBody>
+        </p:sp>
+      </p:grpSp>
+      <p:sp>
+        <p:nvSpPr>
+          <p:cNvPr id="7" name="Rectangle 6">
+            <a:extLst>
+              <a:ext uri="{FF2B5EF4-FFF2-40B4-BE49-F238E27FC236}">
+                <a16:creationId xmlns:a16="http://schemas.microsoft.com/office/drawing/2014/main" id="{B8E9B7C9-8463-4135-A137-B29F9E89C9B1}"/>
+              </a:ext>
+            </a:extLst>
+          </p:cNvPr>
+          <p:cNvSpPr/>
+          <p:nvPr/>
+        </p:nvSpPr>
+        <p:spPr>
+          <a:xfrm>
+            <a:off x="1207363" y="968920"/>
+            <a:ext cx="324000" cy="324000"/>
+          </a:xfrm>
+          <a:prstGeom prst="rect">
+            <a:avLst/>
+          </a:prstGeom>
+          <a:scene3d>
+            <a:camera prst="orthographicFront"/>
+            <a:lightRig rig="threePt" dir="t"/>
+          </a:scene3d>
+          <a:sp3d>
+            <a:bevelT w="63500" h="63500"/>
+          </a:sp3d>
+        </p:spPr>
+        <p:style>
+          <a:lnRef idx="2">
+            <a:schemeClr val="accent3">
+              <a:shade val="50000"/>
+            </a:schemeClr>
+          </a:lnRef>
+          <a:fillRef idx="1">
+            <a:schemeClr val="accent3"/>
+          </a:fillRef>
+          <a:effectRef idx="0">
+            <a:schemeClr val="accent3"/>
+          </a:effectRef>
+          <a:fontRef idx="minor">
+            <a:schemeClr val="lt1"/>
+          </a:fontRef>
+        </p:style>
+        <p:txBody>
+          <a:bodyPr rtlCol="0" anchor="ctr"/>
+          <a:lstStyle/>
+          <a:p>
+            <a:pPr algn="ctr"/>
+            <a:endParaRPr lang="fr-FR"/>
+          </a:p>
+        </p:txBody>
+      </p:sp>
+      <p:sp>
+        <p:nvSpPr>
+          <p:cNvPr id="11" name="Rectangle 10">
+            <a:extLst>
+              <a:ext uri="{FF2B5EF4-FFF2-40B4-BE49-F238E27FC236}">
+                <a16:creationId xmlns:a16="http://schemas.microsoft.com/office/drawing/2014/main" id="{C8E7EEE2-C1CA-4FB1-8DD9-CC05D5C5A55D}"/>
+              </a:ext>
+            </a:extLst>
+          </p:cNvPr>
+          <p:cNvSpPr/>
+          <p:nvPr/>
+        </p:nvSpPr>
+        <p:spPr>
+          <a:xfrm>
+            <a:off x="1546728" y="968920"/>
+            <a:ext cx="324000" cy="324000"/>
+          </a:xfrm>
+          <a:prstGeom prst="rect">
+            <a:avLst/>
+          </a:prstGeom>
+          <a:scene3d>
+            <a:camera prst="orthographicFront"/>
+            <a:lightRig rig="threePt" dir="t"/>
+          </a:scene3d>
+          <a:sp3d>
+            <a:bevelT w="63500" h="63500" prst="relaxedInset"/>
+          </a:sp3d>
+        </p:spPr>
+        <p:style>
+          <a:lnRef idx="2">
+            <a:schemeClr val="accent3">
+              <a:shade val="50000"/>
+            </a:schemeClr>
+          </a:lnRef>
+          <a:fillRef idx="1">
+            <a:schemeClr val="accent3"/>
+          </a:fillRef>
+          <a:effectRef idx="0">
+            <a:schemeClr val="accent3"/>
+          </a:effectRef>
+          <a:fontRef idx="minor">
+            <a:schemeClr val="lt1"/>
+          </a:fontRef>
+        </p:style>
+        <p:txBody>
+          <a:bodyPr rtlCol="0" anchor="ctr"/>
+          <a:lstStyle/>
+          <a:p>
+            <a:pPr algn="ctr"/>
+            <a:endParaRPr lang="fr-FR"/>
+          </a:p>
+        </p:txBody>
+      </p:sp>
+      <p:grpSp>
+        <p:nvGrpSpPr>
+          <p:cNvPr id="18" name="Groupe 17">
+            <a:extLst>
+              <a:ext uri="{FF2B5EF4-FFF2-40B4-BE49-F238E27FC236}">
+                <a16:creationId xmlns:a16="http://schemas.microsoft.com/office/drawing/2014/main" id="{38B19FA3-EFB3-4DEA-AE68-884BA6EA5B7F}"/>
+              </a:ext>
+            </a:extLst>
+          </p:cNvPr>
+          <p:cNvGrpSpPr/>
+          <p:nvPr/>
+        </p:nvGrpSpPr>
+        <p:grpSpPr>
+          <a:xfrm>
+            <a:off x="1211618" y="1389174"/>
+            <a:ext cx="324000" cy="324000"/>
+            <a:chOff x="1211618" y="1389174"/>
+            <a:chExt cx="324000" cy="324000"/>
+          </a:xfrm>
+        </p:grpSpPr>
+        <p:sp>
+          <p:nvSpPr>
+            <p:cNvPr id="12" name="Rectangle 11">
+              <a:extLst>
+                <a:ext uri="{FF2B5EF4-FFF2-40B4-BE49-F238E27FC236}">
+                  <a16:creationId xmlns:a16="http://schemas.microsoft.com/office/drawing/2014/main" id="{914B837E-65C0-4B93-B95C-A0680824BA7B}"/>
+                </a:ext>
+              </a:extLst>
+            </p:cNvPr>
+            <p:cNvSpPr/>
+            <p:nvPr/>
+          </p:nvSpPr>
+          <p:spPr>
+            <a:xfrm>
+              <a:off x="1211618" y="1389174"/>
+              <a:ext cx="324000" cy="324000"/>
+            </a:xfrm>
+            <a:prstGeom prst="rect">
+              <a:avLst/>
+            </a:prstGeom>
+            <a:scene3d>
+              <a:camera prst="orthographicFront"/>
+              <a:lightRig rig="threePt" dir="t"/>
+            </a:scene3d>
+            <a:sp3d>
+              <a:bevelT w="63500" h="63500"/>
+            </a:sp3d>
+          </p:spPr>
+          <p:style>
+            <a:lnRef idx="2">
+              <a:schemeClr val="accent3">
+                <a:shade val="50000"/>
+              </a:schemeClr>
+            </a:lnRef>
+            <a:fillRef idx="1">
+              <a:schemeClr val="accent3"/>
+            </a:fillRef>
+            <a:effectRef idx="0">
+              <a:schemeClr val="accent3"/>
+            </a:effectRef>
+            <a:fontRef idx="minor">
+              <a:schemeClr val="lt1"/>
+            </a:fontRef>
+          </p:style>
+          <p:txBody>
+            <a:bodyPr rtlCol="0" anchor="ctr"/>
+            <a:lstStyle/>
+            <a:p>
+              <a:pPr algn="ctr"/>
+              <a:endParaRPr lang="fr-FR"/>
+            </a:p>
+          </p:txBody>
+        </p:sp>
+        <p:sp>
+          <p:nvSpPr>
+            <p:cNvPr id="14" name="Flèche : droite 13">
+              <a:extLst>
+                <a:ext uri="{FF2B5EF4-FFF2-40B4-BE49-F238E27FC236}">
+                  <a16:creationId xmlns:a16="http://schemas.microsoft.com/office/drawing/2014/main" id="{0DDD9395-BBBF-4E6B-963D-0F7D886638A4}"/>
+                </a:ext>
+              </a:extLst>
+            </p:cNvPr>
+            <p:cNvSpPr/>
+            <p:nvPr/>
+          </p:nvSpPr>
+          <p:spPr>
+            <a:xfrm rot="10800000">
+              <a:off x="1279593" y="1466961"/>
+              <a:ext cx="179540" cy="168425"/>
+            </a:xfrm>
+            <a:prstGeom prst="rightArrow">
+              <a:avLst/>
+            </a:prstGeom>
+          </p:spPr>
+          <p:style>
+            <a:lnRef idx="2">
+              <a:schemeClr val="dk1">
+                <a:shade val="50000"/>
+              </a:schemeClr>
+            </a:lnRef>
+            <a:fillRef idx="1">
+              <a:schemeClr val="dk1"/>
+            </a:fillRef>
+            <a:effectRef idx="0">
+              <a:schemeClr val="dk1"/>
+            </a:effectRef>
+            <a:fontRef idx="minor">
+              <a:schemeClr val="lt1"/>
+            </a:fontRef>
+          </p:style>
+          <p:txBody>
+            <a:bodyPr rtlCol="0" anchor="ctr"/>
+            <a:lstStyle/>
+            <a:p>
+              <a:pPr algn="ctr"/>
+              <a:endParaRPr lang="fr-FR"/>
+            </a:p>
+          </p:txBody>
+        </p:sp>
+      </p:grpSp>
+      <p:grpSp>
+        <p:nvGrpSpPr>
+          <p:cNvPr id="19" name="Groupe 18">
+            <a:extLst>
+              <a:ext uri="{FF2B5EF4-FFF2-40B4-BE49-F238E27FC236}">
+                <a16:creationId xmlns:a16="http://schemas.microsoft.com/office/drawing/2014/main" id="{4A7EABF1-37EF-4C6D-BFF1-28B35CED3EC8}"/>
+              </a:ext>
+            </a:extLst>
+          </p:cNvPr>
+          <p:cNvGrpSpPr/>
+          <p:nvPr/>
+        </p:nvGrpSpPr>
+        <p:grpSpPr>
+          <a:xfrm>
+            <a:off x="1546728" y="1389174"/>
+            <a:ext cx="324000" cy="324000"/>
+            <a:chOff x="1546728" y="1389174"/>
+            <a:chExt cx="324000" cy="324000"/>
+          </a:xfrm>
+        </p:grpSpPr>
+        <p:sp>
+          <p:nvSpPr>
+            <p:cNvPr id="17" name="Rectangle 16">
+              <a:extLst>
+                <a:ext uri="{FF2B5EF4-FFF2-40B4-BE49-F238E27FC236}">
+                  <a16:creationId xmlns:a16="http://schemas.microsoft.com/office/drawing/2014/main" id="{9B3EA70A-EA73-4186-B696-21A9E5201853}"/>
+                </a:ext>
+              </a:extLst>
+            </p:cNvPr>
+            <p:cNvSpPr/>
+            <p:nvPr/>
+          </p:nvSpPr>
+          <p:spPr>
+            <a:xfrm>
+              <a:off x="1546728" y="1389174"/>
+              <a:ext cx="324000" cy="324000"/>
+            </a:xfrm>
+            <a:prstGeom prst="rect">
+              <a:avLst/>
+            </a:prstGeom>
+            <a:scene3d>
+              <a:camera prst="orthographicFront"/>
+              <a:lightRig rig="threePt" dir="t"/>
+            </a:scene3d>
+            <a:sp3d>
+              <a:bevelT w="63500" h="63500" prst="relaxedInset"/>
+            </a:sp3d>
+          </p:spPr>
+          <p:style>
+            <a:lnRef idx="2">
+              <a:schemeClr val="accent3">
+                <a:shade val="50000"/>
+              </a:schemeClr>
+            </a:lnRef>
+            <a:fillRef idx="1">
+              <a:schemeClr val="accent3"/>
+            </a:fillRef>
+            <a:effectRef idx="0">
+              <a:schemeClr val="accent3"/>
+            </a:effectRef>
+            <a:fontRef idx="minor">
+              <a:schemeClr val="lt1"/>
+            </a:fontRef>
+          </p:style>
+          <p:txBody>
+            <a:bodyPr rtlCol="0" anchor="ctr"/>
+            <a:lstStyle/>
+            <a:p>
+              <a:pPr algn="ctr"/>
+              <a:endParaRPr lang="fr-FR"/>
+            </a:p>
+          </p:txBody>
+        </p:sp>
+        <p:sp>
+          <p:nvSpPr>
+            <p:cNvPr id="16" name="Flèche : droite 15">
+              <a:extLst>
+                <a:ext uri="{FF2B5EF4-FFF2-40B4-BE49-F238E27FC236}">
+                  <a16:creationId xmlns:a16="http://schemas.microsoft.com/office/drawing/2014/main" id="{80CADA49-5127-4E09-90D1-1278682A1BA9}"/>
+                </a:ext>
+              </a:extLst>
+            </p:cNvPr>
+            <p:cNvSpPr/>
+            <p:nvPr/>
+          </p:nvSpPr>
+          <p:spPr>
+            <a:xfrm rot="10800000">
+              <a:off x="1618958" y="1466962"/>
+              <a:ext cx="179540" cy="168425"/>
+            </a:xfrm>
+            <a:prstGeom prst="rightArrow">
+              <a:avLst/>
+            </a:prstGeom>
+          </p:spPr>
+          <p:style>
+            <a:lnRef idx="2">
+              <a:schemeClr val="dk1">
+                <a:shade val="50000"/>
+              </a:schemeClr>
+            </a:lnRef>
+            <a:fillRef idx="1">
+              <a:schemeClr val="dk1"/>
+            </a:fillRef>
+            <a:effectRef idx="0">
+              <a:schemeClr val="dk1"/>
+            </a:effectRef>
+            <a:fontRef idx="minor">
+              <a:schemeClr val="lt1"/>
+            </a:fontRef>
+          </p:style>
+          <p:txBody>
+            <a:bodyPr rtlCol="0" anchor="ctr"/>
+            <a:lstStyle/>
+            <a:p>
+              <a:pPr algn="ctr"/>
+              <a:endParaRPr lang="fr-FR"/>
+            </a:p>
+          </p:txBody>
+        </p:sp>
+      </p:grpSp>
+      <p:sp>
+        <p:nvSpPr>
+          <p:cNvPr id="26" name="Rectangle 25">
+            <a:extLst>
+              <a:ext uri="{FF2B5EF4-FFF2-40B4-BE49-F238E27FC236}">
+                <a16:creationId xmlns:a16="http://schemas.microsoft.com/office/drawing/2014/main" id="{5927D9A2-F955-4F60-8F5F-1120F7136201}"/>
+              </a:ext>
+            </a:extLst>
+          </p:cNvPr>
+          <p:cNvSpPr/>
+          <p:nvPr/>
+        </p:nvSpPr>
+        <p:spPr>
+          <a:xfrm>
+            <a:off x="1207361" y="567133"/>
+            <a:ext cx="1620000" cy="324000"/>
+          </a:xfrm>
+          <a:prstGeom prst="rect">
+            <a:avLst/>
+          </a:prstGeom>
+          <a:scene3d>
+            <a:camera prst="orthographicFront"/>
+            <a:lightRig rig="threePt" dir="t"/>
+          </a:scene3d>
+          <a:sp3d>
+            <a:bevelT w="63500" h="63500"/>
+          </a:sp3d>
+        </p:spPr>
+        <p:style>
+          <a:lnRef idx="2">
+            <a:schemeClr val="accent3">
+              <a:shade val="50000"/>
+            </a:schemeClr>
+          </a:lnRef>
+          <a:fillRef idx="1">
+            <a:schemeClr val="accent3"/>
+          </a:fillRef>
+          <a:effectRef idx="0">
+            <a:schemeClr val="accent3"/>
+          </a:effectRef>
+          <a:fontRef idx="minor">
+            <a:schemeClr val="lt1"/>
+          </a:fontRef>
+        </p:style>
+        <p:txBody>
+          <a:bodyPr rtlCol="0" anchor="ctr"/>
+          <a:lstStyle/>
+          <a:p>
+            <a:pPr algn="ctr"/>
+            <a:endParaRPr lang="fr-FR"/>
+          </a:p>
+        </p:txBody>
+      </p:sp>
+      <p:grpSp>
+        <p:nvGrpSpPr>
+          <p:cNvPr id="27" name="Groupe 26">
+            <a:extLst>
+              <a:ext uri="{FF2B5EF4-FFF2-40B4-BE49-F238E27FC236}">
+                <a16:creationId xmlns:a16="http://schemas.microsoft.com/office/drawing/2014/main" id="{81BD5D0A-1B26-4AD0-B98A-8E18CFA1816A}"/>
+              </a:ext>
+            </a:extLst>
+          </p:cNvPr>
+          <p:cNvGrpSpPr/>
+          <p:nvPr/>
+        </p:nvGrpSpPr>
+        <p:grpSpPr>
+          <a:xfrm>
+            <a:off x="1207363" y="1754299"/>
+            <a:ext cx="324000" cy="324000"/>
+            <a:chOff x="1211618" y="1389174"/>
+            <a:chExt cx="324000" cy="324000"/>
+          </a:xfrm>
+        </p:grpSpPr>
+        <p:sp>
+          <p:nvSpPr>
+            <p:cNvPr id="28" name="Rectangle 27">
+              <a:extLst>
+                <a:ext uri="{FF2B5EF4-FFF2-40B4-BE49-F238E27FC236}">
+                  <a16:creationId xmlns:a16="http://schemas.microsoft.com/office/drawing/2014/main" id="{E039D3C8-32E7-4812-9B35-C569D80CA4D5}"/>
+                </a:ext>
+              </a:extLst>
+            </p:cNvPr>
+            <p:cNvSpPr/>
+            <p:nvPr/>
+          </p:nvSpPr>
+          <p:spPr>
+            <a:xfrm>
+              <a:off x="1211618" y="1389174"/>
+              <a:ext cx="324000" cy="324000"/>
+            </a:xfrm>
+            <a:prstGeom prst="rect">
+              <a:avLst/>
+            </a:prstGeom>
+            <a:scene3d>
+              <a:camera prst="orthographicFront"/>
+              <a:lightRig rig="threePt" dir="t"/>
+            </a:scene3d>
+            <a:sp3d>
+              <a:bevelT w="63500" h="63500"/>
+            </a:sp3d>
+          </p:spPr>
+          <p:style>
+            <a:lnRef idx="2">
+              <a:schemeClr val="accent3">
+                <a:shade val="50000"/>
+              </a:schemeClr>
+            </a:lnRef>
+            <a:fillRef idx="1">
+              <a:schemeClr val="accent3"/>
+            </a:fillRef>
+            <a:effectRef idx="0">
+              <a:schemeClr val="accent3"/>
+            </a:effectRef>
+            <a:fontRef idx="minor">
+              <a:schemeClr val="lt1"/>
+            </a:fontRef>
+          </p:style>
+          <p:txBody>
+            <a:bodyPr rtlCol="0" anchor="ctr"/>
+            <a:lstStyle/>
+            <a:p>
+              <a:pPr algn="ctr"/>
+              <a:endParaRPr lang="fr-FR"/>
+            </a:p>
+          </p:txBody>
+        </p:sp>
+        <p:sp>
+          <p:nvSpPr>
+            <p:cNvPr id="29" name="Flèche : droite 28">
+              <a:extLst>
+                <a:ext uri="{FF2B5EF4-FFF2-40B4-BE49-F238E27FC236}">
+                  <a16:creationId xmlns:a16="http://schemas.microsoft.com/office/drawing/2014/main" id="{4A1238A0-3251-4C8F-9EDA-C19450622FDC}"/>
+                </a:ext>
+              </a:extLst>
+            </p:cNvPr>
+            <p:cNvSpPr/>
+            <p:nvPr/>
+          </p:nvSpPr>
+          <p:spPr>
+            <a:xfrm>
+              <a:off x="1279593" y="1466961"/>
+              <a:ext cx="179540" cy="168425"/>
+            </a:xfrm>
+            <a:prstGeom prst="rightArrow">
+              <a:avLst/>
+            </a:prstGeom>
+          </p:spPr>
+          <p:style>
+            <a:lnRef idx="2">
+              <a:schemeClr val="dk1">
+                <a:shade val="50000"/>
+              </a:schemeClr>
+            </a:lnRef>
+            <a:fillRef idx="1">
+              <a:schemeClr val="dk1"/>
+            </a:fillRef>
+            <a:effectRef idx="0">
+              <a:schemeClr val="dk1"/>
+            </a:effectRef>
+            <a:fontRef idx="minor">
+              <a:schemeClr val="lt1"/>
+            </a:fontRef>
+          </p:style>
+          <p:txBody>
+            <a:bodyPr rtlCol="0" anchor="ctr"/>
+            <a:lstStyle/>
+            <a:p>
+              <a:pPr algn="ctr"/>
+              <a:endParaRPr lang="fr-FR"/>
+            </a:p>
+          </p:txBody>
+        </p:sp>
+      </p:grpSp>
+      <p:grpSp>
+        <p:nvGrpSpPr>
+          <p:cNvPr id="30" name="Groupe 29">
+            <a:extLst>
+              <a:ext uri="{FF2B5EF4-FFF2-40B4-BE49-F238E27FC236}">
+                <a16:creationId xmlns:a16="http://schemas.microsoft.com/office/drawing/2014/main" id="{44E142CE-AFE8-4166-B524-9AB30C7ACC61}"/>
+              </a:ext>
+            </a:extLst>
+          </p:cNvPr>
+          <p:cNvGrpSpPr/>
+          <p:nvPr/>
+        </p:nvGrpSpPr>
+        <p:grpSpPr>
+          <a:xfrm>
+            <a:off x="1546727" y="1754298"/>
+            <a:ext cx="324000" cy="324000"/>
+            <a:chOff x="1546728" y="1389174"/>
+            <a:chExt cx="324000" cy="324000"/>
+          </a:xfrm>
+        </p:grpSpPr>
+        <p:sp>
+          <p:nvSpPr>
+            <p:cNvPr id="31" name="Rectangle 30">
+              <a:extLst>
+                <a:ext uri="{FF2B5EF4-FFF2-40B4-BE49-F238E27FC236}">
+                  <a16:creationId xmlns:a16="http://schemas.microsoft.com/office/drawing/2014/main" id="{1FEDB684-2BBC-4405-9769-77A1A4B02B66}"/>
+                </a:ext>
+              </a:extLst>
+            </p:cNvPr>
+            <p:cNvSpPr/>
+            <p:nvPr/>
+          </p:nvSpPr>
+          <p:spPr>
+            <a:xfrm>
+              <a:off x="1546728" y="1389174"/>
+              <a:ext cx="324000" cy="324000"/>
+            </a:xfrm>
+            <a:prstGeom prst="rect">
+              <a:avLst/>
+            </a:prstGeom>
+            <a:scene3d>
+              <a:camera prst="orthographicFront"/>
+              <a:lightRig rig="threePt" dir="t"/>
+            </a:scene3d>
+            <a:sp3d>
+              <a:bevelT w="63500" h="63500" prst="relaxedInset"/>
+            </a:sp3d>
+          </p:spPr>
+          <p:style>
+            <a:lnRef idx="2">
+              <a:schemeClr val="accent3">
+                <a:shade val="50000"/>
+              </a:schemeClr>
+            </a:lnRef>
+            <a:fillRef idx="1">
+              <a:schemeClr val="accent3"/>
+            </a:fillRef>
+            <a:effectRef idx="0">
+              <a:schemeClr val="accent3"/>
+            </a:effectRef>
+            <a:fontRef idx="minor">
+              <a:schemeClr val="lt1"/>
+            </a:fontRef>
+          </p:style>
+          <p:txBody>
+            <a:bodyPr rtlCol="0" anchor="ctr"/>
+            <a:lstStyle/>
+            <a:p>
+              <a:pPr algn="ctr"/>
+              <a:endParaRPr lang="fr-FR"/>
+            </a:p>
+          </p:txBody>
+        </p:sp>
+        <p:sp>
+          <p:nvSpPr>
+            <p:cNvPr id="32" name="Flèche : droite 31">
+              <a:extLst>
+                <a:ext uri="{FF2B5EF4-FFF2-40B4-BE49-F238E27FC236}">
+                  <a16:creationId xmlns:a16="http://schemas.microsoft.com/office/drawing/2014/main" id="{FEF19DF2-2779-4486-BF25-CD77FDAA2720}"/>
+                </a:ext>
+              </a:extLst>
+            </p:cNvPr>
+            <p:cNvSpPr/>
+            <p:nvPr/>
+          </p:nvSpPr>
+          <p:spPr>
+            <a:xfrm>
+              <a:off x="1618958" y="1466962"/>
+              <a:ext cx="179540" cy="168425"/>
+            </a:xfrm>
+            <a:prstGeom prst="rightArrow">
+              <a:avLst/>
+            </a:prstGeom>
+          </p:spPr>
+          <p:style>
+            <a:lnRef idx="2">
+              <a:schemeClr val="dk1">
+                <a:shade val="50000"/>
+              </a:schemeClr>
+            </a:lnRef>
+            <a:fillRef idx="1">
+              <a:schemeClr val="dk1"/>
+            </a:fillRef>
+            <a:effectRef idx="0">
+              <a:schemeClr val="dk1"/>
+            </a:effectRef>
+            <a:fontRef idx="minor">
+              <a:schemeClr val="lt1"/>
+            </a:fontRef>
+          </p:style>
+          <p:txBody>
+            <a:bodyPr rtlCol="0" anchor="ctr"/>
+            <a:lstStyle/>
+            <a:p>
+              <a:pPr algn="ctr"/>
+              <a:endParaRPr lang="fr-FR"/>
+            </a:p>
+          </p:txBody>
+        </p:sp>
+      </p:grpSp>
+      <p:grpSp>
+        <p:nvGrpSpPr>
+          <p:cNvPr id="42" name="Groupe 41">
+            <a:extLst>
+              <a:ext uri="{FF2B5EF4-FFF2-40B4-BE49-F238E27FC236}">
+                <a16:creationId xmlns:a16="http://schemas.microsoft.com/office/drawing/2014/main" id="{8A36954C-C63F-4AFB-BAA7-2427AF13E289}"/>
+              </a:ext>
+            </a:extLst>
+          </p:cNvPr>
+          <p:cNvGrpSpPr/>
+          <p:nvPr/>
+        </p:nvGrpSpPr>
+        <p:grpSpPr>
+          <a:xfrm>
+            <a:off x="2376348" y="1320304"/>
+            <a:ext cx="324000" cy="324000"/>
+            <a:chOff x="2376348" y="1320304"/>
+            <a:chExt cx="324000" cy="324000"/>
+          </a:xfrm>
+        </p:grpSpPr>
+        <p:sp>
+          <p:nvSpPr>
+            <p:cNvPr id="34" name="Rectangle 33">
+              <a:extLst>
+                <a:ext uri="{FF2B5EF4-FFF2-40B4-BE49-F238E27FC236}">
+                  <a16:creationId xmlns:a16="http://schemas.microsoft.com/office/drawing/2014/main" id="{2E653354-D35F-4B70-A640-6FC068442C44}"/>
+                </a:ext>
+              </a:extLst>
+            </p:cNvPr>
+            <p:cNvSpPr/>
+            <p:nvPr/>
+          </p:nvSpPr>
+          <p:spPr>
+            <a:xfrm>
+              <a:off x="2376348" y="1320304"/>
+              <a:ext cx="324000" cy="324000"/>
+            </a:xfrm>
+            <a:prstGeom prst="rect">
+              <a:avLst/>
+            </a:prstGeom>
+            <a:scene3d>
+              <a:camera prst="orthographicFront"/>
+              <a:lightRig rig="threePt" dir="t"/>
+            </a:scene3d>
+            <a:sp3d>
+              <a:bevelT w="63500" h="63500"/>
+            </a:sp3d>
+          </p:spPr>
+          <p:style>
+            <a:lnRef idx="2">
+              <a:schemeClr val="accent3">
+                <a:shade val="50000"/>
+              </a:schemeClr>
+            </a:lnRef>
+            <a:fillRef idx="1">
+              <a:schemeClr val="accent3"/>
+            </a:fillRef>
+            <a:effectRef idx="0">
+              <a:schemeClr val="accent3"/>
+            </a:effectRef>
+            <a:fontRef idx="minor">
+              <a:schemeClr val="lt1"/>
+            </a:fontRef>
+          </p:style>
+          <p:txBody>
+            <a:bodyPr rtlCol="0" anchor="ctr"/>
+            <a:lstStyle/>
+            <a:p>
+              <a:pPr algn="ctr"/>
+              <a:endParaRPr lang="fr-FR"/>
+            </a:p>
+          </p:txBody>
+        </p:sp>
+        <p:sp>
+          <p:nvSpPr>
+            <p:cNvPr id="37" name="Forme libre : forme 36">
+              <a:extLst>
+                <a:ext uri="{FF2B5EF4-FFF2-40B4-BE49-F238E27FC236}">
+                  <a16:creationId xmlns:a16="http://schemas.microsoft.com/office/drawing/2014/main" id="{F57850AD-9AA9-4248-B73A-76526BA59C1E}"/>
+                </a:ext>
+              </a:extLst>
+            </p:cNvPr>
+            <p:cNvSpPr/>
+            <p:nvPr/>
+          </p:nvSpPr>
+          <p:spPr>
+            <a:xfrm>
+              <a:off x="2427223" y="1381970"/>
+              <a:ext cx="222250" cy="200668"/>
+            </a:xfrm>
+            <a:custGeom>
+              <a:avLst/>
+              <a:gdLst>
+                <a:gd name="connsiteX0" fmla="*/ 0 w 222250"/>
+                <a:gd name="connsiteY0" fmla="*/ 111125 h 200668"/>
+                <a:gd name="connsiteX1" fmla="*/ 107950 w 222250"/>
+                <a:gd name="connsiteY1" fmla="*/ 196850 h 200668"/>
+                <a:gd name="connsiteX2" fmla="*/ 222250 w 222250"/>
+                <a:gd name="connsiteY2" fmla="*/ 0 h 200668"/>
+              </a:gdLst>
+              <a:ahLst/>
+              <a:cxnLst>
+                <a:cxn ang="0">
+                  <a:pos x="connsiteX0" y="connsiteY0"/>
+                </a:cxn>
+                <a:cxn ang="0">
+                  <a:pos x="connsiteX1" y="connsiteY1"/>
+                </a:cxn>
+                <a:cxn ang="0">
+                  <a:pos x="connsiteX2" y="connsiteY2"/>
+                </a:cxn>
+              </a:cxnLst>
+              <a:rect l="l" t="t" r="r" b="b"/>
+              <a:pathLst>
+                <a:path w="222250" h="200668">
+                  <a:moveTo>
+                    <a:pt x="0" y="111125"/>
+                  </a:moveTo>
+                  <a:cubicBezTo>
+                    <a:pt x="35454" y="163248"/>
+                    <a:pt x="70908" y="215371"/>
+                    <a:pt x="107950" y="196850"/>
+                  </a:cubicBezTo>
+                  <a:cubicBezTo>
+                    <a:pt x="144992" y="178329"/>
+                    <a:pt x="155575" y="49212"/>
+                    <a:pt x="222250" y="0"/>
+                  </a:cubicBezTo>
+                </a:path>
+              </a:pathLst>
+            </a:custGeom>
+            <a:noFill/>
+            <a:ln w="38100">
+              <a:solidFill>
+                <a:schemeClr val="tx1"/>
+              </a:solidFill>
+            </a:ln>
+          </p:spPr>
+          <p:style>
+            <a:lnRef idx="2">
+              <a:schemeClr val="accent1">
+                <a:shade val="50000"/>
+              </a:schemeClr>
+            </a:lnRef>
+            <a:fillRef idx="1">
+              <a:schemeClr val="accent1"/>
+            </a:fillRef>
+            <a:effectRef idx="0">
+              <a:schemeClr val="accent1"/>
+            </a:effectRef>
+            <a:fontRef idx="minor">
+              <a:schemeClr val="lt1"/>
+            </a:fontRef>
+          </p:style>
+          <p:txBody>
+            <a:bodyPr rtlCol="0" anchor="ctr"/>
+            <a:lstStyle/>
+            <a:p>
+              <a:pPr algn="ctr"/>
+              <a:endParaRPr lang="fr-FR"/>
+            </a:p>
+          </p:txBody>
+        </p:sp>
+      </p:grpSp>
+      <p:grpSp>
+        <p:nvGrpSpPr>
+          <p:cNvPr id="41" name="Groupe 40">
+            <a:extLst>
+              <a:ext uri="{FF2B5EF4-FFF2-40B4-BE49-F238E27FC236}">
+                <a16:creationId xmlns:a16="http://schemas.microsoft.com/office/drawing/2014/main" id="{8B274169-6A0D-4045-B269-E552844D2830}"/>
+              </a:ext>
+            </a:extLst>
+          </p:cNvPr>
+          <p:cNvGrpSpPr/>
+          <p:nvPr/>
+        </p:nvGrpSpPr>
+        <p:grpSpPr>
+          <a:xfrm>
+            <a:off x="2729370" y="1320304"/>
+            <a:ext cx="324000" cy="324000"/>
+            <a:chOff x="2729370" y="1320304"/>
+            <a:chExt cx="324000" cy="324000"/>
+          </a:xfrm>
+        </p:grpSpPr>
+        <p:sp>
+          <p:nvSpPr>
+            <p:cNvPr id="39" name="Rectangle 38">
+              <a:extLst>
+                <a:ext uri="{FF2B5EF4-FFF2-40B4-BE49-F238E27FC236}">
+                  <a16:creationId xmlns:a16="http://schemas.microsoft.com/office/drawing/2014/main" id="{AAC5D484-1F4F-472E-8748-539FC32E488B}"/>
+                </a:ext>
+              </a:extLst>
+            </p:cNvPr>
+            <p:cNvSpPr/>
+            <p:nvPr/>
+          </p:nvSpPr>
+          <p:spPr>
+            <a:xfrm>
+              <a:off x="2729370" y="1320304"/>
+              <a:ext cx="324000" cy="324000"/>
+            </a:xfrm>
+            <a:prstGeom prst="rect">
+              <a:avLst/>
+            </a:prstGeom>
+            <a:scene3d>
+              <a:camera prst="orthographicFront"/>
+              <a:lightRig rig="threePt" dir="t"/>
+            </a:scene3d>
+            <a:sp3d>
+              <a:bevelT w="63500" h="63500" prst="relaxedInset"/>
+            </a:sp3d>
+          </p:spPr>
+          <p:style>
+            <a:lnRef idx="2">
+              <a:schemeClr val="accent3">
+                <a:shade val="50000"/>
+              </a:schemeClr>
+            </a:lnRef>
+            <a:fillRef idx="1">
+              <a:schemeClr val="accent3"/>
+            </a:fillRef>
+            <a:effectRef idx="0">
+              <a:schemeClr val="accent3"/>
+            </a:effectRef>
+            <a:fontRef idx="minor">
+              <a:schemeClr val="lt1"/>
+            </a:fontRef>
+          </p:style>
+          <p:txBody>
+            <a:bodyPr rtlCol="0" anchor="ctr"/>
+            <a:lstStyle/>
+            <a:p>
+              <a:pPr algn="ctr"/>
+              <a:endParaRPr lang="fr-FR"/>
+            </a:p>
+          </p:txBody>
+        </p:sp>
+        <p:sp>
+          <p:nvSpPr>
+            <p:cNvPr id="40" name="Forme libre : forme 39">
+              <a:extLst>
+                <a:ext uri="{FF2B5EF4-FFF2-40B4-BE49-F238E27FC236}">
+                  <a16:creationId xmlns:a16="http://schemas.microsoft.com/office/drawing/2014/main" id="{D4D7DF42-29CD-401B-9C85-3745C2ABE40B}"/>
+                </a:ext>
+              </a:extLst>
+            </p:cNvPr>
+            <p:cNvSpPr/>
+            <p:nvPr/>
+          </p:nvSpPr>
+          <p:spPr>
+            <a:xfrm>
+              <a:off x="2780245" y="1381970"/>
+              <a:ext cx="222250" cy="200668"/>
+            </a:xfrm>
+            <a:custGeom>
+              <a:avLst/>
+              <a:gdLst>
+                <a:gd name="connsiteX0" fmla="*/ 0 w 222250"/>
+                <a:gd name="connsiteY0" fmla="*/ 111125 h 200668"/>
+                <a:gd name="connsiteX1" fmla="*/ 107950 w 222250"/>
+                <a:gd name="connsiteY1" fmla="*/ 196850 h 200668"/>
+                <a:gd name="connsiteX2" fmla="*/ 222250 w 222250"/>
+                <a:gd name="connsiteY2" fmla="*/ 0 h 200668"/>
+              </a:gdLst>
+              <a:ahLst/>
+              <a:cxnLst>
+                <a:cxn ang="0">
+                  <a:pos x="connsiteX0" y="connsiteY0"/>
+                </a:cxn>
+                <a:cxn ang="0">
+                  <a:pos x="connsiteX1" y="connsiteY1"/>
+                </a:cxn>
+                <a:cxn ang="0">
+                  <a:pos x="connsiteX2" y="connsiteY2"/>
+                </a:cxn>
+              </a:cxnLst>
+              <a:rect l="l" t="t" r="r" b="b"/>
+              <a:pathLst>
+                <a:path w="222250" h="200668">
+                  <a:moveTo>
+                    <a:pt x="0" y="111125"/>
+                  </a:moveTo>
+                  <a:cubicBezTo>
+                    <a:pt x="35454" y="163248"/>
+                    <a:pt x="70908" y="215371"/>
+                    <a:pt x="107950" y="196850"/>
+                  </a:cubicBezTo>
+                  <a:cubicBezTo>
+                    <a:pt x="144992" y="178329"/>
+                    <a:pt x="155575" y="49212"/>
+                    <a:pt x="222250" y="0"/>
+                  </a:cubicBezTo>
+                </a:path>
+              </a:pathLst>
+            </a:custGeom>
+            <a:noFill/>
+            <a:ln w="38100">
+              <a:solidFill>
+                <a:schemeClr val="tx1"/>
+              </a:solidFill>
+            </a:ln>
+          </p:spPr>
+          <p:style>
+            <a:lnRef idx="2">
+              <a:schemeClr val="accent1">
+                <a:shade val="50000"/>
+              </a:schemeClr>
+            </a:lnRef>
+            <a:fillRef idx="1">
+              <a:schemeClr val="accent1"/>
+            </a:fillRef>
+            <a:effectRef idx="0">
+              <a:schemeClr val="accent1"/>
             </a:effectRef>
             <a:fontRef idx="minor">
               <a:schemeClr val="lt1"/>

</xml_diff>

<commit_message>
Create MonthView template and add buttons (no interactions implemented)
</commit_message>
<xml_diff>
--- a/Documents/Brainstorming.pptx
+++ b/Documents/Brainstorming.pptx
@@ -261,7 +261,7 @@
           <a:p>
             <a:fld id="{FAC533C7-ED63-4344-B326-4F3AD794C492}" type="datetimeFigureOut">
               <a:rPr lang="fr-FR" smtClean="0"/>
-              <a:t>07/07/2021</a:t>
+              <a:t>08/07/2021</a:t>
             </a:fld>
             <a:endParaRPr lang="fr-FR"/>
           </a:p>
@@ -459,7 +459,7 @@
           <a:p>
             <a:fld id="{FAC533C7-ED63-4344-B326-4F3AD794C492}" type="datetimeFigureOut">
               <a:rPr lang="fr-FR" smtClean="0"/>
-              <a:t>07/07/2021</a:t>
+              <a:t>08/07/2021</a:t>
             </a:fld>
             <a:endParaRPr lang="fr-FR"/>
           </a:p>
@@ -667,7 +667,7 @@
           <a:p>
             <a:fld id="{FAC533C7-ED63-4344-B326-4F3AD794C492}" type="datetimeFigureOut">
               <a:rPr lang="fr-FR" smtClean="0"/>
-              <a:t>07/07/2021</a:t>
+              <a:t>08/07/2021</a:t>
             </a:fld>
             <a:endParaRPr lang="fr-FR"/>
           </a:p>
@@ -865,7 +865,7 @@
           <a:p>
             <a:fld id="{FAC533C7-ED63-4344-B326-4F3AD794C492}" type="datetimeFigureOut">
               <a:rPr lang="fr-FR" smtClean="0"/>
-              <a:t>07/07/2021</a:t>
+              <a:t>08/07/2021</a:t>
             </a:fld>
             <a:endParaRPr lang="fr-FR"/>
           </a:p>
@@ -1140,7 +1140,7 @@
           <a:p>
             <a:fld id="{FAC533C7-ED63-4344-B326-4F3AD794C492}" type="datetimeFigureOut">
               <a:rPr lang="fr-FR" smtClean="0"/>
-              <a:t>07/07/2021</a:t>
+              <a:t>08/07/2021</a:t>
             </a:fld>
             <a:endParaRPr lang="fr-FR"/>
           </a:p>
@@ -1405,7 +1405,7 @@
           <a:p>
             <a:fld id="{FAC533C7-ED63-4344-B326-4F3AD794C492}" type="datetimeFigureOut">
               <a:rPr lang="fr-FR" smtClean="0"/>
-              <a:t>07/07/2021</a:t>
+              <a:t>08/07/2021</a:t>
             </a:fld>
             <a:endParaRPr lang="fr-FR"/>
           </a:p>
@@ -1817,7 +1817,7 @@
           <a:p>
             <a:fld id="{FAC533C7-ED63-4344-B326-4F3AD794C492}" type="datetimeFigureOut">
               <a:rPr lang="fr-FR" smtClean="0"/>
-              <a:t>07/07/2021</a:t>
+              <a:t>08/07/2021</a:t>
             </a:fld>
             <a:endParaRPr lang="fr-FR"/>
           </a:p>
@@ -1958,7 +1958,7 @@
           <a:p>
             <a:fld id="{FAC533C7-ED63-4344-B326-4F3AD794C492}" type="datetimeFigureOut">
               <a:rPr lang="fr-FR" smtClean="0"/>
-              <a:t>07/07/2021</a:t>
+              <a:t>08/07/2021</a:t>
             </a:fld>
             <a:endParaRPr lang="fr-FR"/>
           </a:p>
@@ -2071,7 +2071,7 @@
           <a:p>
             <a:fld id="{FAC533C7-ED63-4344-B326-4F3AD794C492}" type="datetimeFigureOut">
               <a:rPr lang="fr-FR" smtClean="0"/>
-              <a:t>07/07/2021</a:t>
+              <a:t>08/07/2021</a:t>
             </a:fld>
             <a:endParaRPr lang="fr-FR"/>
           </a:p>
@@ -2382,7 +2382,7 @@
           <a:p>
             <a:fld id="{FAC533C7-ED63-4344-B326-4F3AD794C492}" type="datetimeFigureOut">
               <a:rPr lang="fr-FR" smtClean="0"/>
-              <a:t>07/07/2021</a:t>
+              <a:t>08/07/2021</a:t>
             </a:fld>
             <a:endParaRPr lang="fr-FR"/>
           </a:p>
@@ -2670,7 +2670,7 @@
           <a:p>
             <a:fld id="{FAC533C7-ED63-4344-B326-4F3AD794C492}" type="datetimeFigureOut">
               <a:rPr lang="fr-FR" smtClean="0"/>
-              <a:t>07/07/2021</a:t>
+              <a:t>08/07/2021</a:t>
             </a:fld>
             <a:endParaRPr lang="fr-FR"/>
           </a:p>
@@ -2911,7 +2911,7 @@
           <a:p>
             <a:fld id="{FAC533C7-ED63-4344-B326-4F3AD794C492}" type="datetimeFigureOut">
               <a:rPr lang="fr-FR" smtClean="0"/>
-              <a:t>07/07/2021</a:t>
+              <a:t>08/07/2021</a:t>
             </a:fld>
             <a:endParaRPr lang="fr-FR"/>
           </a:p>
@@ -5179,7 +5179,7 @@
         </p:nvGrpSpPr>
         <p:grpSpPr>
           <a:xfrm>
-            <a:off x="1129652" y="2988165"/>
+            <a:off x="1256992" y="2941463"/>
             <a:ext cx="360000" cy="360000"/>
             <a:chOff x="1129652" y="2988165"/>
             <a:chExt cx="360000" cy="360000"/>
@@ -5298,6 +5298,1794 @@
             <a:noFill/>
           </p:spPr>
         </p:pic>
+      </p:grpSp>
+      <p:sp>
+        <p:nvSpPr>
+          <p:cNvPr id="13" name="Rectangle 12">
+            <a:extLst>
+              <a:ext uri="{FF2B5EF4-FFF2-40B4-BE49-F238E27FC236}">
+                <a16:creationId xmlns:a16="http://schemas.microsoft.com/office/drawing/2014/main" id="{717F04AD-2E23-49B2-A7D7-31E5BE409BA3}"/>
+              </a:ext>
+            </a:extLst>
+          </p:cNvPr>
+          <p:cNvSpPr/>
+          <p:nvPr/>
+        </p:nvSpPr>
+        <p:spPr>
+          <a:xfrm>
+            <a:off x="8044425" y="2988071"/>
+            <a:ext cx="1800000" cy="900000"/>
+          </a:xfrm>
+          <a:prstGeom prst="rect">
+            <a:avLst/>
+          </a:prstGeom>
+        </p:spPr>
+        <p:style>
+          <a:lnRef idx="2">
+            <a:schemeClr val="accent1">
+              <a:shade val="50000"/>
+            </a:schemeClr>
+          </a:lnRef>
+          <a:fillRef idx="1">
+            <a:schemeClr val="accent1"/>
+          </a:fillRef>
+          <a:effectRef idx="0">
+            <a:schemeClr val="accent1"/>
+          </a:effectRef>
+          <a:fontRef idx="minor">
+            <a:schemeClr val="lt1"/>
+          </a:fontRef>
+        </p:style>
+        <p:txBody>
+          <a:bodyPr rtlCol="0" anchor="ctr"/>
+          <a:lstStyle/>
+          <a:p>
+            <a:pPr algn="ctr"/>
+            <a:endParaRPr lang="fr-FR"/>
+          </a:p>
+        </p:txBody>
+      </p:sp>
+      <p:sp>
+        <p:nvSpPr>
+          <p:cNvPr id="15" name="Rectangle 14">
+            <a:extLst>
+              <a:ext uri="{FF2B5EF4-FFF2-40B4-BE49-F238E27FC236}">
+                <a16:creationId xmlns:a16="http://schemas.microsoft.com/office/drawing/2014/main" id="{30999970-E6F6-4DF9-BF67-0B23BE084CC3}"/>
+              </a:ext>
+            </a:extLst>
+          </p:cNvPr>
+          <p:cNvSpPr/>
+          <p:nvPr/>
+        </p:nvSpPr>
+        <p:spPr>
+          <a:xfrm>
+            <a:off x="9934426" y="3708071"/>
+            <a:ext cx="1260000" cy="540000"/>
+          </a:xfrm>
+          <a:prstGeom prst="rect">
+            <a:avLst/>
+          </a:prstGeom>
+        </p:spPr>
+        <p:style>
+          <a:lnRef idx="2">
+            <a:schemeClr val="accent1">
+              <a:shade val="50000"/>
+            </a:schemeClr>
+          </a:lnRef>
+          <a:fillRef idx="1">
+            <a:schemeClr val="accent1"/>
+          </a:fillRef>
+          <a:effectRef idx="0">
+            <a:schemeClr val="accent1"/>
+          </a:effectRef>
+          <a:fontRef idx="minor">
+            <a:schemeClr val="lt1"/>
+          </a:fontRef>
+        </p:style>
+        <p:txBody>
+          <a:bodyPr rtlCol="0" anchor="ctr"/>
+          <a:lstStyle/>
+          <a:p>
+            <a:pPr algn="ctr"/>
+            <a:endParaRPr lang="fr-FR"/>
+          </a:p>
+        </p:txBody>
+      </p:sp>
+      <p:sp>
+        <p:nvSpPr>
+          <p:cNvPr id="43" name="Rectangle 42">
+            <a:extLst>
+              <a:ext uri="{FF2B5EF4-FFF2-40B4-BE49-F238E27FC236}">
+                <a16:creationId xmlns:a16="http://schemas.microsoft.com/office/drawing/2014/main" id="{785E4D9D-2B1C-40AB-B0D1-E714BBAA32A9}"/>
+              </a:ext>
+            </a:extLst>
+          </p:cNvPr>
+          <p:cNvSpPr/>
+          <p:nvPr/>
+        </p:nvSpPr>
+        <p:spPr>
+          <a:xfrm>
+            <a:off x="9934425" y="3168071"/>
+            <a:ext cx="1260000" cy="360000"/>
+          </a:xfrm>
+          <a:prstGeom prst="rect">
+            <a:avLst/>
+          </a:prstGeom>
+        </p:spPr>
+        <p:style>
+          <a:lnRef idx="2">
+            <a:schemeClr val="accent1">
+              <a:shade val="50000"/>
+            </a:schemeClr>
+          </a:lnRef>
+          <a:fillRef idx="1">
+            <a:schemeClr val="accent1"/>
+          </a:fillRef>
+          <a:effectRef idx="0">
+            <a:schemeClr val="accent1"/>
+          </a:effectRef>
+          <a:fontRef idx="minor">
+            <a:schemeClr val="lt1"/>
+          </a:fontRef>
+        </p:style>
+        <p:txBody>
+          <a:bodyPr rtlCol="0" anchor="ctr"/>
+          <a:lstStyle/>
+          <a:p>
+            <a:pPr algn="ctr"/>
+            <a:endParaRPr lang="fr-FR"/>
+          </a:p>
+        </p:txBody>
+      </p:sp>
+      <p:sp>
+        <p:nvSpPr>
+          <p:cNvPr id="44" name="Rectangle 43">
+            <a:extLst>
+              <a:ext uri="{FF2B5EF4-FFF2-40B4-BE49-F238E27FC236}">
+                <a16:creationId xmlns:a16="http://schemas.microsoft.com/office/drawing/2014/main" id="{D062989C-EBFA-4574-BB7D-1A7D722CEB42}"/>
+              </a:ext>
+            </a:extLst>
+          </p:cNvPr>
+          <p:cNvSpPr/>
+          <p:nvPr/>
+        </p:nvSpPr>
+        <p:spPr>
+          <a:xfrm>
+            <a:off x="9934425" y="2988071"/>
+            <a:ext cx="1260000" cy="180000"/>
+          </a:xfrm>
+          <a:prstGeom prst="rect">
+            <a:avLst/>
+          </a:prstGeom>
+        </p:spPr>
+        <p:style>
+          <a:lnRef idx="2">
+            <a:schemeClr val="accent1">
+              <a:shade val="50000"/>
+            </a:schemeClr>
+          </a:lnRef>
+          <a:fillRef idx="1">
+            <a:schemeClr val="accent1"/>
+          </a:fillRef>
+          <a:effectRef idx="0">
+            <a:schemeClr val="accent1"/>
+          </a:effectRef>
+          <a:fontRef idx="minor">
+            <a:schemeClr val="lt1"/>
+          </a:fontRef>
+        </p:style>
+        <p:txBody>
+          <a:bodyPr rtlCol="0" anchor="ctr"/>
+          <a:lstStyle/>
+          <a:p>
+            <a:pPr algn="ctr"/>
+            <a:endParaRPr lang="fr-FR"/>
+          </a:p>
+        </p:txBody>
+      </p:sp>
+      <p:grpSp>
+        <p:nvGrpSpPr>
+          <p:cNvPr id="65" name="Groupe 64">
+            <a:extLst>
+              <a:ext uri="{FF2B5EF4-FFF2-40B4-BE49-F238E27FC236}">
+                <a16:creationId xmlns:a16="http://schemas.microsoft.com/office/drawing/2014/main" id="{D0675198-600F-497F-9E16-D92691BE1BC7}"/>
+              </a:ext>
+            </a:extLst>
+          </p:cNvPr>
+          <p:cNvGrpSpPr/>
+          <p:nvPr/>
+        </p:nvGrpSpPr>
+        <p:grpSpPr>
+          <a:xfrm>
+            <a:off x="342240" y="3564641"/>
+            <a:ext cx="360000" cy="360000"/>
+            <a:chOff x="342240" y="3564641"/>
+            <a:chExt cx="360000" cy="360000"/>
+          </a:xfrm>
+        </p:grpSpPr>
+        <p:sp>
+          <p:nvSpPr>
+            <p:cNvPr id="46" name="Rectangle : coins arrondis 45">
+              <a:extLst>
+                <a:ext uri="{FF2B5EF4-FFF2-40B4-BE49-F238E27FC236}">
+                  <a16:creationId xmlns:a16="http://schemas.microsoft.com/office/drawing/2014/main" id="{D4D7D8A9-9628-4A69-B54D-E815BB0D5F6C}"/>
+                </a:ext>
+              </a:extLst>
+            </p:cNvPr>
+            <p:cNvSpPr/>
+            <p:nvPr/>
+          </p:nvSpPr>
+          <p:spPr>
+            <a:xfrm>
+              <a:off x="342240" y="3564641"/>
+              <a:ext cx="360000" cy="360000"/>
+            </a:xfrm>
+            <a:prstGeom prst="roundRect">
+              <a:avLst/>
+            </a:prstGeom>
+            <a:ln w="57150"/>
+            <a:effectLst/>
+            <a:scene3d>
+              <a:camera prst="orthographicFront"/>
+              <a:lightRig rig="threePt" dir="t"/>
+            </a:scene3d>
+            <a:sp3d>
+              <a:bevelT w="101600" h="101600"/>
+            </a:sp3d>
+          </p:spPr>
+          <p:style>
+            <a:lnRef idx="2">
+              <a:schemeClr val="accent1">
+                <a:shade val="50000"/>
+              </a:schemeClr>
+            </a:lnRef>
+            <a:fillRef idx="1">
+              <a:schemeClr val="accent1"/>
+            </a:fillRef>
+            <a:effectRef idx="0">
+              <a:schemeClr val="accent1"/>
+            </a:effectRef>
+            <a:fontRef idx="minor">
+              <a:schemeClr val="lt1"/>
+            </a:fontRef>
+          </p:style>
+          <p:txBody>
+            <a:bodyPr rtlCol="0" anchor="ctr"/>
+            <a:lstStyle/>
+            <a:p>
+              <a:pPr algn="ctr"/>
+              <a:endParaRPr lang="fr-FR"/>
+            </a:p>
+          </p:txBody>
+        </p:sp>
+        <p:pic>
+          <p:nvPicPr>
+            <p:cNvPr id="24" name="Image 23" descr="Une image contenant transport, roue, matériel&#10;&#10;Description générée automatiquement">
+              <a:extLst>
+                <a:ext uri="{FF2B5EF4-FFF2-40B4-BE49-F238E27FC236}">
+                  <a16:creationId xmlns:a16="http://schemas.microsoft.com/office/drawing/2014/main" id="{F808ADA6-AB3B-45CE-A5EA-CD14B4FE2606}"/>
+                </a:ext>
+              </a:extLst>
+            </p:cNvPr>
+            <p:cNvPicPr>
+              <a:picLocks noChangeAspect="1"/>
+            </p:cNvPicPr>
+            <p:nvPr/>
+          </p:nvPicPr>
+          <p:blipFill rotWithShape="1">
+            <a:blip r:embed="rId4">
+              <a:extLst>
+                <a:ext uri="{BEBA8EAE-BF5A-486C-A8C5-ECC9F3942E4B}">
+                  <a14:imgProps xmlns:a14="http://schemas.microsoft.com/office/drawing/2010/main">
+                    <a14:imgLayer r:embed="rId5">
+                      <a14:imgEffect>
+                        <a14:backgroundRemoval t="10000" b="90000" l="10000" r="90000">
+                          <a14:backgroundMark x1="75714" y1="46122" x2="75714" y2="46122"/>
+                          <a14:backgroundMark x1="69796" y1="48980" x2="69796" y2="48980"/>
+                          <a14:backgroundMark x1="70816" y1="48571" x2="70816" y2="48571"/>
+                          <a14:backgroundMark x1="77959" y1="33673" x2="64082" y2="80612"/>
+                          <a14:backgroundMark x1="78980" y1="43265" x2="66531" y2="43265"/>
+                        </a14:backgroundRemoval>
+                      </a14:imgEffect>
+                    </a14:imgLayer>
+                  </a14:imgProps>
+                </a:ext>
+                <a:ext uri="{28A0092B-C50C-407E-A947-70E740481C1C}">
+                  <a14:useLocalDpi xmlns:a14="http://schemas.microsoft.com/office/drawing/2010/main" val="0"/>
+                </a:ext>
+              </a:extLst>
+            </a:blip>
+            <a:srcRect l="6275" t="7346" r="34919" b="34919"/>
+            <a:stretch/>
+          </p:blipFill>
+          <p:spPr>
+            <a:xfrm>
+              <a:off x="375937" y="3600926"/>
+              <a:ext cx="292762" cy="287430"/>
+            </a:xfrm>
+            <a:prstGeom prst="rect">
+              <a:avLst/>
+            </a:prstGeom>
+          </p:spPr>
+        </p:pic>
+      </p:grpSp>
+      <p:grpSp>
+        <p:nvGrpSpPr>
+          <p:cNvPr id="70" name="Groupe 69">
+            <a:extLst>
+              <a:ext uri="{FF2B5EF4-FFF2-40B4-BE49-F238E27FC236}">
+                <a16:creationId xmlns:a16="http://schemas.microsoft.com/office/drawing/2014/main" id="{4136F623-2E1C-41C2-9594-3B297DC94F32}"/>
+              </a:ext>
+            </a:extLst>
+          </p:cNvPr>
+          <p:cNvGrpSpPr/>
+          <p:nvPr/>
+        </p:nvGrpSpPr>
+        <p:grpSpPr>
+          <a:xfrm>
+            <a:off x="784546" y="3564735"/>
+            <a:ext cx="360000" cy="360000"/>
+            <a:chOff x="784546" y="3564735"/>
+            <a:chExt cx="360000" cy="360000"/>
+          </a:xfrm>
+        </p:grpSpPr>
+        <p:sp>
+          <p:nvSpPr>
+            <p:cNvPr id="49" name="Rectangle : coins arrondis 48">
+              <a:extLst>
+                <a:ext uri="{FF2B5EF4-FFF2-40B4-BE49-F238E27FC236}">
+                  <a16:creationId xmlns:a16="http://schemas.microsoft.com/office/drawing/2014/main" id="{D15697CD-924A-4223-94E9-5ABDBC2F5504}"/>
+                </a:ext>
+              </a:extLst>
+            </p:cNvPr>
+            <p:cNvSpPr/>
+            <p:nvPr/>
+          </p:nvSpPr>
+          <p:spPr>
+            <a:xfrm>
+              <a:off x="784546" y="3564735"/>
+              <a:ext cx="360000" cy="360000"/>
+            </a:xfrm>
+            <a:prstGeom prst="roundRect">
+              <a:avLst/>
+            </a:prstGeom>
+            <a:ln w="57150"/>
+            <a:effectLst/>
+            <a:scene3d>
+              <a:camera prst="orthographicFront"/>
+              <a:lightRig rig="threePt" dir="t"/>
+            </a:scene3d>
+            <a:sp3d>
+              <a:bevelT w="101600" h="101600" prst="relaxedInset"/>
+            </a:sp3d>
+          </p:spPr>
+          <p:style>
+            <a:lnRef idx="2">
+              <a:schemeClr val="accent1">
+                <a:shade val="50000"/>
+              </a:schemeClr>
+            </a:lnRef>
+            <a:fillRef idx="1">
+              <a:schemeClr val="accent1"/>
+            </a:fillRef>
+            <a:effectRef idx="0">
+              <a:schemeClr val="accent1"/>
+            </a:effectRef>
+            <a:fontRef idx="minor">
+              <a:schemeClr val="lt1"/>
+            </a:fontRef>
+          </p:style>
+          <p:txBody>
+            <a:bodyPr rtlCol="0" anchor="ctr"/>
+            <a:lstStyle/>
+            <a:p>
+              <a:pPr algn="ctr"/>
+              <a:endParaRPr lang="fr-FR" dirty="0"/>
+            </a:p>
+          </p:txBody>
+        </p:sp>
+        <p:pic>
+          <p:nvPicPr>
+            <p:cNvPr id="59" name="Image 58" descr="Une image contenant transport, roue, matériel&#10;&#10;Description générée automatiquement">
+              <a:extLst>
+                <a:ext uri="{FF2B5EF4-FFF2-40B4-BE49-F238E27FC236}">
+                  <a16:creationId xmlns:a16="http://schemas.microsoft.com/office/drawing/2014/main" id="{CF3274F5-8372-4C43-A08D-22BE468962FD}"/>
+                </a:ext>
+              </a:extLst>
+            </p:cNvPr>
+            <p:cNvPicPr>
+              <a:picLocks noChangeAspect="1"/>
+            </p:cNvPicPr>
+            <p:nvPr/>
+          </p:nvPicPr>
+          <p:blipFill rotWithShape="1">
+            <a:blip r:embed="rId4">
+              <a:extLst>
+                <a:ext uri="{BEBA8EAE-BF5A-486C-A8C5-ECC9F3942E4B}">
+                  <a14:imgProps xmlns:a14="http://schemas.microsoft.com/office/drawing/2010/main">
+                    <a14:imgLayer r:embed="rId5">
+                      <a14:imgEffect>
+                        <a14:backgroundRemoval t="10000" b="90000" l="10000" r="90000">
+                          <a14:backgroundMark x1="75714" y1="46122" x2="75714" y2="46122"/>
+                          <a14:backgroundMark x1="69796" y1="48980" x2="69796" y2="48980"/>
+                          <a14:backgroundMark x1="70816" y1="48571" x2="70816" y2="48571"/>
+                          <a14:backgroundMark x1="77959" y1="33673" x2="64082" y2="80612"/>
+                          <a14:backgroundMark x1="78980" y1="43265" x2="66531" y2="43265"/>
+                        </a14:backgroundRemoval>
+                      </a14:imgEffect>
+                    </a14:imgLayer>
+                  </a14:imgProps>
+                </a:ext>
+                <a:ext uri="{28A0092B-C50C-407E-A947-70E740481C1C}">
+                  <a14:useLocalDpi xmlns:a14="http://schemas.microsoft.com/office/drawing/2010/main" val="0"/>
+                </a:ext>
+              </a:extLst>
+            </a:blip>
+            <a:srcRect l="6275" t="7346" r="34919" b="34919"/>
+            <a:stretch/>
+          </p:blipFill>
+          <p:spPr>
+            <a:xfrm>
+              <a:off x="820831" y="3600926"/>
+              <a:ext cx="292762" cy="287430"/>
+            </a:xfrm>
+            <a:prstGeom prst="rect">
+              <a:avLst/>
+            </a:prstGeom>
+          </p:spPr>
+        </p:pic>
+      </p:grpSp>
+      <p:grpSp>
+        <p:nvGrpSpPr>
+          <p:cNvPr id="71" name="Groupe 70">
+            <a:extLst>
+              <a:ext uri="{FF2B5EF4-FFF2-40B4-BE49-F238E27FC236}">
+                <a16:creationId xmlns:a16="http://schemas.microsoft.com/office/drawing/2014/main" id="{B8028E84-1CAA-4C44-93EF-21D78DE700D6}"/>
+              </a:ext>
+            </a:extLst>
+          </p:cNvPr>
+          <p:cNvGrpSpPr/>
+          <p:nvPr/>
+        </p:nvGrpSpPr>
+        <p:grpSpPr>
+          <a:xfrm>
+            <a:off x="342240" y="4000935"/>
+            <a:ext cx="360000" cy="360000"/>
+            <a:chOff x="342240" y="4000935"/>
+            <a:chExt cx="360000" cy="360000"/>
+          </a:xfrm>
+        </p:grpSpPr>
+        <p:sp>
+          <p:nvSpPr>
+            <p:cNvPr id="51" name="Rectangle : coins arrondis 50">
+              <a:extLst>
+                <a:ext uri="{FF2B5EF4-FFF2-40B4-BE49-F238E27FC236}">
+                  <a16:creationId xmlns:a16="http://schemas.microsoft.com/office/drawing/2014/main" id="{24BE10F5-8633-4FEE-97CE-2B71DB5B74B6}"/>
+                </a:ext>
+              </a:extLst>
+            </p:cNvPr>
+            <p:cNvSpPr/>
+            <p:nvPr/>
+          </p:nvSpPr>
+          <p:spPr>
+            <a:xfrm>
+              <a:off x="342240" y="4000935"/>
+              <a:ext cx="360000" cy="360000"/>
+            </a:xfrm>
+            <a:prstGeom prst="roundRect">
+              <a:avLst/>
+            </a:prstGeom>
+            <a:ln w="57150"/>
+            <a:effectLst/>
+            <a:scene3d>
+              <a:camera prst="orthographicFront"/>
+              <a:lightRig rig="threePt" dir="t"/>
+            </a:scene3d>
+            <a:sp3d>
+              <a:bevelT w="101600" h="101600"/>
+            </a:sp3d>
+          </p:spPr>
+          <p:style>
+            <a:lnRef idx="2">
+              <a:schemeClr val="accent1">
+                <a:shade val="50000"/>
+              </a:schemeClr>
+            </a:lnRef>
+            <a:fillRef idx="1">
+              <a:schemeClr val="accent1"/>
+            </a:fillRef>
+            <a:effectRef idx="0">
+              <a:schemeClr val="accent1"/>
+            </a:effectRef>
+            <a:fontRef idx="minor">
+              <a:schemeClr val="lt1"/>
+            </a:fontRef>
+          </p:style>
+          <p:txBody>
+            <a:bodyPr rtlCol="0" anchor="ctr"/>
+            <a:lstStyle/>
+            <a:p>
+              <a:pPr algn="ctr"/>
+              <a:endParaRPr lang="fr-FR"/>
+            </a:p>
+          </p:txBody>
+        </p:sp>
+        <p:pic>
+          <p:nvPicPr>
+            <p:cNvPr id="61" name="Image 60">
+              <a:extLst>
+                <a:ext uri="{FF2B5EF4-FFF2-40B4-BE49-F238E27FC236}">
+                  <a16:creationId xmlns:a16="http://schemas.microsoft.com/office/drawing/2014/main" id="{981D8808-CEEF-41CF-B085-76AEB8AB3E3B}"/>
+                </a:ext>
+              </a:extLst>
+            </p:cNvPr>
+            <p:cNvPicPr>
+              <a:picLocks noChangeAspect="1"/>
+            </p:cNvPicPr>
+            <p:nvPr/>
+          </p:nvPicPr>
+          <p:blipFill rotWithShape="1">
+            <a:blip r:embed="rId6">
+              <a:extLst>
+                <a:ext uri="{BEBA8EAE-BF5A-486C-A8C5-ECC9F3942E4B}">
+                  <a14:imgProps xmlns:a14="http://schemas.microsoft.com/office/drawing/2010/main">
+                    <a14:imgLayer r:embed="rId7">
+                      <a14:imgEffect>
+                        <a14:backgroundRemoval t="10000" b="90000" l="10000" r="90000">
+                          <a14:foregroundMark x1="28829" y1="36458" x2="28829" y2="36458"/>
+                          <a14:backgroundMark x1="54955" y1="53125" x2="54955" y2="53125"/>
+                        </a14:backgroundRemoval>
+                      </a14:imgEffect>
+                    </a14:imgLayer>
+                  </a14:imgProps>
+                </a:ext>
+                <a:ext uri="{28A0092B-C50C-407E-A947-70E740481C1C}">
+                  <a14:useLocalDpi xmlns:a14="http://schemas.microsoft.com/office/drawing/2010/main" val="0"/>
+                </a:ext>
+              </a:extLst>
+            </a:blip>
+            <a:srcRect l="18411" t="10105" r="20568" b="7181"/>
+            <a:stretch/>
+          </p:blipFill>
+          <p:spPr>
+            <a:xfrm>
+              <a:off x="407940" y="4046936"/>
+              <a:ext cx="228600" cy="267997"/>
+            </a:xfrm>
+            <a:prstGeom prst="rect">
+              <a:avLst/>
+            </a:prstGeom>
+          </p:spPr>
+        </p:pic>
+      </p:grpSp>
+      <p:grpSp>
+        <p:nvGrpSpPr>
+          <p:cNvPr id="72" name="Groupe 71">
+            <a:extLst>
+              <a:ext uri="{FF2B5EF4-FFF2-40B4-BE49-F238E27FC236}">
+                <a16:creationId xmlns:a16="http://schemas.microsoft.com/office/drawing/2014/main" id="{0E65C52E-CD5B-4EA6-9107-E51DA65A7E8C}"/>
+              </a:ext>
+            </a:extLst>
+          </p:cNvPr>
+          <p:cNvGrpSpPr/>
+          <p:nvPr/>
+        </p:nvGrpSpPr>
+        <p:grpSpPr>
+          <a:xfrm>
+            <a:off x="784546" y="4001029"/>
+            <a:ext cx="360000" cy="360000"/>
+            <a:chOff x="784546" y="4001029"/>
+            <a:chExt cx="360000" cy="360000"/>
+          </a:xfrm>
+        </p:grpSpPr>
+        <p:sp>
+          <p:nvSpPr>
+            <p:cNvPr id="52" name="Rectangle : coins arrondis 51">
+              <a:extLst>
+                <a:ext uri="{FF2B5EF4-FFF2-40B4-BE49-F238E27FC236}">
+                  <a16:creationId xmlns:a16="http://schemas.microsoft.com/office/drawing/2014/main" id="{F3BB6CED-FC38-421B-9835-511A79092ED0}"/>
+                </a:ext>
+              </a:extLst>
+            </p:cNvPr>
+            <p:cNvSpPr/>
+            <p:nvPr/>
+          </p:nvSpPr>
+          <p:spPr>
+            <a:xfrm>
+              <a:off x="784546" y="4001029"/>
+              <a:ext cx="360000" cy="360000"/>
+            </a:xfrm>
+            <a:prstGeom prst="roundRect">
+              <a:avLst/>
+            </a:prstGeom>
+            <a:ln w="57150"/>
+            <a:effectLst/>
+            <a:scene3d>
+              <a:camera prst="orthographicFront"/>
+              <a:lightRig rig="threePt" dir="t"/>
+            </a:scene3d>
+            <a:sp3d>
+              <a:bevelT w="101600" h="101600" prst="relaxedInset"/>
+            </a:sp3d>
+          </p:spPr>
+          <p:style>
+            <a:lnRef idx="2">
+              <a:schemeClr val="accent1">
+                <a:shade val="50000"/>
+              </a:schemeClr>
+            </a:lnRef>
+            <a:fillRef idx="1">
+              <a:schemeClr val="accent1"/>
+            </a:fillRef>
+            <a:effectRef idx="0">
+              <a:schemeClr val="accent1"/>
+            </a:effectRef>
+            <a:fontRef idx="minor">
+              <a:schemeClr val="lt1"/>
+            </a:fontRef>
+          </p:style>
+          <p:txBody>
+            <a:bodyPr rtlCol="0" anchor="ctr"/>
+            <a:lstStyle/>
+            <a:p>
+              <a:pPr algn="ctr"/>
+              <a:endParaRPr lang="fr-FR" dirty="0"/>
+            </a:p>
+          </p:txBody>
+        </p:sp>
+        <p:pic>
+          <p:nvPicPr>
+            <p:cNvPr id="62" name="Image 61">
+              <a:extLst>
+                <a:ext uri="{FF2B5EF4-FFF2-40B4-BE49-F238E27FC236}">
+                  <a16:creationId xmlns:a16="http://schemas.microsoft.com/office/drawing/2014/main" id="{42998D46-A78D-4760-AE1C-2DFE73FAEB2D}"/>
+                </a:ext>
+              </a:extLst>
+            </p:cNvPr>
+            <p:cNvPicPr>
+              <a:picLocks noChangeAspect="1"/>
+            </p:cNvPicPr>
+            <p:nvPr/>
+          </p:nvPicPr>
+          <p:blipFill rotWithShape="1">
+            <a:blip r:embed="rId6">
+              <a:extLst>
+                <a:ext uri="{BEBA8EAE-BF5A-486C-A8C5-ECC9F3942E4B}">
+                  <a14:imgProps xmlns:a14="http://schemas.microsoft.com/office/drawing/2010/main">
+                    <a14:imgLayer r:embed="rId7">
+                      <a14:imgEffect>
+                        <a14:backgroundRemoval t="10000" b="90000" l="10000" r="90000">
+                          <a14:foregroundMark x1="28829" y1="36458" x2="28829" y2="36458"/>
+                          <a14:backgroundMark x1="54955" y1="53125" x2="54955" y2="53125"/>
+                        </a14:backgroundRemoval>
+                      </a14:imgEffect>
+                    </a14:imgLayer>
+                  </a14:imgProps>
+                </a:ext>
+                <a:ext uri="{28A0092B-C50C-407E-A947-70E740481C1C}">
+                  <a14:useLocalDpi xmlns:a14="http://schemas.microsoft.com/office/drawing/2010/main" val="0"/>
+                </a:ext>
+              </a:extLst>
+            </a:blip>
+            <a:srcRect l="18411" t="10105" r="20568" b="7181"/>
+            <a:stretch/>
+          </p:blipFill>
+          <p:spPr>
+            <a:xfrm>
+              <a:off x="850458" y="4046936"/>
+              <a:ext cx="228600" cy="267997"/>
+            </a:xfrm>
+            <a:prstGeom prst="rect">
+              <a:avLst/>
+            </a:prstGeom>
+          </p:spPr>
+        </p:pic>
+      </p:grpSp>
+      <p:grpSp>
+        <p:nvGrpSpPr>
+          <p:cNvPr id="73" name="Groupe 72">
+            <a:extLst>
+              <a:ext uri="{FF2B5EF4-FFF2-40B4-BE49-F238E27FC236}">
+                <a16:creationId xmlns:a16="http://schemas.microsoft.com/office/drawing/2014/main" id="{A398F7F5-51A4-45EE-8E1A-13C590C65ED1}"/>
+              </a:ext>
+            </a:extLst>
+          </p:cNvPr>
+          <p:cNvGrpSpPr/>
+          <p:nvPr/>
+        </p:nvGrpSpPr>
+        <p:grpSpPr>
+          <a:xfrm>
+            <a:off x="342240" y="4437135"/>
+            <a:ext cx="360000" cy="360000"/>
+            <a:chOff x="342240" y="4437135"/>
+            <a:chExt cx="360000" cy="360000"/>
+          </a:xfrm>
+        </p:grpSpPr>
+        <p:sp>
+          <p:nvSpPr>
+            <p:cNvPr id="53" name="Rectangle : coins arrondis 52">
+              <a:extLst>
+                <a:ext uri="{FF2B5EF4-FFF2-40B4-BE49-F238E27FC236}">
+                  <a16:creationId xmlns:a16="http://schemas.microsoft.com/office/drawing/2014/main" id="{1F5A8D37-81E8-42DC-B265-C61F2A679478}"/>
+                </a:ext>
+              </a:extLst>
+            </p:cNvPr>
+            <p:cNvSpPr/>
+            <p:nvPr/>
+          </p:nvSpPr>
+          <p:spPr>
+            <a:xfrm>
+              <a:off x="342240" y="4437135"/>
+              <a:ext cx="360000" cy="360000"/>
+            </a:xfrm>
+            <a:prstGeom prst="roundRect">
+              <a:avLst/>
+            </a:prstGeom>
+            <a:ln w="57150"/>
+            <a:effectLst/>
+            <a:scene3d>
+              <a:camera prst="orthographicFront"/>
+              <a:lightRig rig="threePt" dir="t"/>
+            </a:scene3d>
+            <a:sp3d>
+              <a:bevelT w="101600" h="101600"/>
+            </a:sp3d>
+          </p:spPr>
+          <p:style>
+            <a:lnRef idx="2">
+              <a:schemeClr val="accent1">
+                <a:shade val="50000"/>
+              </a:schemeClr>
+            </a:lnRef>
+            <a:fillRef idx="1">
+              <a:schemeClr val="accent1"/>
+            </a:fillRef>
+            <a:effectRef idx="0">
+              <a:schemeClr val="accent1"/>
+            </a:effectRef>
+            <a:fontRef idx="minor">
+              <a:schemeClr val="lt1"/>
+            </a:fontRef>
+          </p:style>
+          <p:txBody>
+            <a:bodyPr rtlCol="0" anchor="ctr"/>
+            <a:lstStyle/>
+            <a:p>
+              <a:pPr algn="ctr"/>
+              <a:endParaRPr lang="fr-FR"/>
+            </a:p>
+          </p:txBody>
+        </p:sp>
+        <p:pic>
+          <p:nvPicPr>
+            <p:cNvPr id="1026" name="Picture 2" descr="changa picto">
+              <a:extLst>
+                <a:ext uri="{FF2B5EF4-FFF2-40B4-BE49-F238E27FC236}">
+                  <a16:creationId xmlns:a16="http://schemas.microsoft.com/office/drawing/2014/main" id="{8A811AFE-BCA9-40FD-8803-A5CEBAA3F6A6}"/>
+                </a:ext>
+              </a:extLst>
+            </p:cNvPr>
+            <p:cNvPicPr>
+              <a:picLocks noChangeAspect="1" noChangeArrowheads="1"/>
+            </p:cNvPicPr>
+            <p:nvPr/>
+          </p:nvPicPr>
+          <p:blipFill>
+            <a:blip r:embed="rId8">
+              <a:extLst>
+                <a:ext uri="{BEBA8EAE-BF5A-486C-A8C5-ECC9F3942E4B}">
+                  <a14:imgProps xmlns:a14="http://schemas.microsoft.com/office/drawing/2010/main">
+                    <a14:imgLayer r:embed="rId9">
+                      <a14:imgEffect>
+                        <a14:backgroundRemoval t="2667" b="99556" l="0" r="97778">
+                          <a14:foregroundMark x1="57920" y1="31111" x2="83556" y2="41333"/>
+                          <a14:foregroundMark x1="56807" y1="30667" x2="57920" y2="31111"/>
+                          <a14:foregroundMark x1="55691" y1="30222" x2="56807" y2="30667"/>
+                          <a14:foregroundMark x1="54578" y1="29778" x2="55691" y2="30222"/>
+                          <a14:foregroundMark x1="53462" y1="29333" x2="54578" y2="29778"/>
+                          <a14:foregroundMark x1="52348" y1="28889" x2="53462" y2="29333"/>
+                          <a14:foregroundMark x1="51275" y1="28461" x2="52348" y2="28889"/>
+                          <a14:foregroundMark x1="50119" y1="28000" x2="51241" y2="28448"/>
+                          <a14:foregroundMark x1="49006" y1="27556" x2="50119" y2="28000"/>
+                          <a14:foregroundMark x1="45683" y1="26231" x2="46683" y2="26630"/>
+                          <a14:foregroundMark x1="11111" y1="12444" x2="17043" y2="14810"/>
+                          <a14:foregroundMark x1="83556" y1="41333" x2="26222" y2="32889"/>
+                          <a14:foregroundMark x1="41333" y1="37333" x2="17778" y2="38222"/>
+                          <a14:foregroundMark x1="45333" y1="45333" x2="22667" y2="43111"/>
+                          <a14:foregroundMark x1="45333" y1="42222" x2="17778" y2="39111"/>
+                          <a14:foregroundMark x1="28444" y1="42667" x2="12444" y2="20889"/>
+                          <a14:foregroundMark x1="14667" y1="44889" x2="5778" y2="22667"/>
+                          <a14:foregroundMark x1="7556" y1="12000" x2="2667" y2="20889"/>
+                          <a14:foregroundMark x1="6222" y1="19111" x2="2667" y2="20444"/>
+                          <a14:foregroundMark x1="11556" y1="12000" x2="0" y2="2667"/>
+                          <a14:foregroundMark x1="7111" y1="10222" x2="15556" y2="4444"/>
+                          <a14:foregroundMark x1="8000" y1="24444" x2="4000" y2="46222"/>
+                          <a14:foregroundMark x1="4000" y1="40000" x2="4889" y2="57333"/>
+                          <a14:foregroundMark x1="5333" y1="48000" x2="6667" y2="73333"/>
+                          <a14:foregroundMark x1="4444" y1="55556" x2="5333" y2="85778"/>
+                          <a14:foregroundMark x1="4083" y1="91111" x2="4000" y2="97333"/>
+                          <a14:foregroundMark x1="4444" y1="64000" x2="4083" y2="91111"/>
+                          <a14:foregroundMark x1="9608" y1="97743" x2="32444" y2="99556"/>
+                          <a14:foregroundMark x1="4444" y1="97333" x2="9381" y2="97725"/>
+                          <a14:foregroundMark x1="17108" y1="91627" x2="61333" y2="97333"/>
+                          <a14:foregroundMark x1="12399" y1="91019" x2="12482" y2="91030"/>
+                          <a14:foregroundMark x1="6222" y1="90222" x2="10968" y2="90835"/>
+                          <a14:foregroundMark x1="18359" y1="93436" x2="87556" y2="96444"/>
+                          <a14:foregroundMark x1="58222" y1="96444" x2="91556" y2="94222"/>
+                          <a14:foregroundMark x1="92889" y1="96889" x2="95556" y2="99556"/>
+                          <a14:foregroundMark x1="91111" y1="98667" x2="96444" y2="66222"/>
+                          <a14:foregroundMark x1="94222" y1="97778" x2="96889" y2="68444"/>
+                          <a14:foregroundMark x1="94742" y1="51111" x2="94222" y2="34222"/>
+                          <a14:foregroundMark x1="94783" y1="52444" x2="94742" y2="51111"/>
+                          <a14:foregroundMark x1="94797" y1="52889" x2="94783" y2="52444"/>
+                          <a14:foregroundMark x1="94811" y1="53333" x2="94797" y2="52889"/>
+                          <a14:foregroundMark x1="94852" y1="54667" x2="94811" y2="53333"/>
+                          <a14:foregroundMark x1="94866" y1="55111" x2="94852" y2="54667"/>
+                          <a14:foregroundMark x1="94900" y1="56240" x2="94866" y2="55111"/>
+                          <a14:foregroundMark x1="96000" y1="92000" x2="94904" y2="56361"/>
+                          <a14:foregroundMark x1="71189" y1="48025" x2="60000" y2="44444"/>
+                          <a14:foregroundMark x1="93333" y1="55111" x2="92557" y2="54863"/>
+                          <a14:foregroundMark x1="88889" y1="47556" x2="85946" y2="46986"/>
+                          <a14:foregroundMark x1="97778" y1="48444" x2="80889" y2="20889"/>
+                          <a14:foregroundMark x1="67556" y1="39111" x2="79111" y2="32444"/>
+                          <a14:foregroundMark x1="66222" y1="37333" x2="75111" y2="18222"/>
+                          <a14:foregroundMark x1="79111" y1="33333" x2="73778" y2="5778"/>
+                          <a14:foregroundMark x1="73778" y1="20889" x2="76889" y2="4889"/>
+                          <a14:foregroundMark x1="90667" y1="33778" x2="89778" y2="16889"/>
+                          <a14:foregroundMark x1="95556" y1="32889" x2="95111" y2="20889"/>
+                          <a14:foregroundMark x1="93778" y1="22222" x2="79111" y2="4444"/>
+                          <a14:foregroundMark x1="56889" y1="10667" x2="56889" y2="22222"/>
+                          <a14:foregroundMark x1="56889" y1="20889" x2="54667" y2="15556"/>
+                          <a14:foregroundMark x1="57778" y1="27556" x2="56000" y2="8000"/>
+                          <a14:foregroundMark x1="23111" y1="60444" x2="27111" y2="60000"/>
+                          <a14:foregroundMark x1="32444" y1="60444" x2="32444" y2="60444"/>
+                          <a14:foregroundMark x1="41778" y1="59111" x2="41778" y2="59111"/>
+                          <a14:foregroundMark x1="48000" y1="59111" x2="48000" y2="59111"/>
+                          <a14:foregroundMark x1="51556" y1="60000" x2="51556" y2="60000"/>
+                          <a14:foregroundMark x1="56889" y1="60444" x2="56889" y2="60444"/>
+                          <a14:foregroundMark x1="60889" y1="60444" x2="60889" y2="60444"/>
+                          <a14:foregroundMark x1="66667" y1="60444" x2="68444" y2="60000"/>
+                          <a14:foregroundMark x1="72000" y1="59556" x2="72000" y2="59556"/>
+                          <a14:foregroundMark x1="75457" y1="58565" x2="15556" y2="56889"/>
+                          <a14:foregroundMark x1="65333" y1="60444" x2="83131" y2="60031"/>
+                          <a14:foregroundMark x1="18667" y1="69333" x2="79111" y2="69778"/>
+                          <a14:foregroundMark x1="82222" y1="71111" x2="82222" y2="71111"/>
+                          <a14:foregroundMark x1="45778" y1="80000" x2="45778" y2="80000"/>
+                          <a14:foregroundMark x1="32000" y1="81778" x2="48444" y2="81778"/>
+                          <a14:foregroundMark x1="58222" y1="83111" x2="65778" y2="83111"/>
+                          <a14:foregroundMark x1="71111" y1="82667" x2="71111" y2="82667"/>
+                          <a14:foregroundMark x1="25333" y1="81333" x2="19111" y2="80889"/>
+                          <a14:backgroundMark x1="35301" y1="14363" x2="38222" y2="9333"/>
+                          <a14:backgroundMark x1="28000" y1="28444" x2="28000" y2="28444"/>
+                          <a14:backgroundMark x1="27111" y1="23556" x2="33333" y2="26222"/>
+                          <a14:backgroundMark x1="22222" y1="21778" x2="22222" y2="19556"/>
+                          <a14:backgroundMark x1="25778" y1="20444" x2="31556" y2="17778"/>
+                          <a14:backgroundMark x1="24444" y1="16444" x2="23111" y2="20889"/>
+                          <a14:backgroundMark x1="36444" y1="23111" x2="40000" y2="23111"/>
+                          <a14:backgroundMark x1="42667" y1="27556" x2="44000" y2="27556"/>
+                          <a14:backgroundMark x1="39111" y1="24889" x2="39111" y2="24889"/>
+                          <a14:backgroundMark x1="37333" y1="21778" x2="37333" y2="21778"/>
+                          <a14:backgroundMark x1="36889" y1="23556" x2="39111" y2="19556"/>
+                          <a14:backgroundMark x1="37778" y1="23111" x2="33778" y2="20889"/>
+                          <a14:backgroundMark x1="40889" y1="21778" x2="39111" y2="22222"/>
+                          <a14:backgroundMark x1="42222" y1="25333" x2="42222" y2="25333"/>
+                          <a14:backgroundMark x1="40889" y1="24000" x2="40889" y2="24000"/>
+                          <a14:backgroundMark x1="40000" y1="24889" x2="40000" y2="24889"/>
+                          <a14:backgroundMark x1="37778" y1="24000" x2="37778" y2="24000"/>
+                          <a14:backgroundMark x1="40444" y1="24000" x2="40444" y2="24000"/>
+                          <a14:backgroundMark x1="40444" y1="23111" x2="39111" y2="24889"/>
+                          <a14:backgroundMark x1="44000" y1="26222" x2="45333" y2="26667"/>
+                          <a14:backgroundMark x1="47111" y1="27556" x2="47111" y2="27556"/>
+                          <a14:backgroundMark x1="48000" y1="28000" x2="48000" y2="28000"/>
+                          <a14:backgroundMark x1="48444" y1="28000" x2="48444" y2="28000"/>
+                          <a14:backgroundMark x1="50667" y1="28000" x2="50667" y2="28000"/>
+                          <a14:backgroundMark x1="51111" y1="30222" x2="51111" y2="30222"/>
+                          <a14:backgroundMark x1="48889" y1="29333" x2="48889" y2="29333"/>
+                          <a14:backgroundMark x1="54667" y1="29333" x2="54667" y2="29333"/>
+                          <a14:backgroundMark x1="56444" y1="29778" x2="56444" y2="29778"/>
+                          <a14:backgroundMark x1="57333" y1="30222" x2="57333" y2="30222"/>
+                          <a14:backgroundMark x1="53778" y1="30667" x2="53778" y2="30667"/>
+                          <a14:backgroundMark x1="51556" y1="30667" x2="51556" y2="30667"/>
+                          <a14:backgroundMark x1="52889" y1="30222" x2="52889" y2="30222"/>
+                          <a14:backgroundMark x1="52889" y1="29333" x2="52889" y2="29333"/>
+                          <a14:backgroundMark x1="52889" y1="29333" x2="52889" y2="29333"/>
+                          <a14:backgroundMark x1="52444" y1="27556" x2="52444" y2="27556"/>
+                          <a14:backgroundMark x1="51111" y1="29333" x2="51111" y2="29333"/>
+                          <a14:backgroundMark x1="51556" y1="29333" x2="51111" y2="28000"/>
+                          <a14:backgroundMark x1="48000" y1="27556" x2="48000" y2="27556"/>
+                          <a14:backgroundMark x1="46222" y1="27556" x2="46222" y2="27556"/>
+                          <a14:backgroundMark x1="46222" y1="26222" x2="46222" y2="26222"/>
+                          <a14:backgroundMark x1="46667" y1="26222" x2="46667" y2="26222"/>
+                          <a14:backgroundMark x1="48000" y1="26667" x2="48889" y2="27111"/>
+                          <a14:backgroundMark x1="49333" y1="27556" x2="49333" y2="27556"/>
+                          <a14:backgroundMark x1="48444" y1="28000" x2="48444" y2="28000"/>
+                          <a14:backgroundMark x1="47556" y1="28000" x2="47556" y2="28000"/>
+                          <a14:backgroundMark x1="45778" y1="27111" x2="45778" y2="27111"/>
+                          <a14:backgroundMark x1="47556" y1="27556" x2="48889" y2="27556"/>
+                          <a14:backgroundMark x1="49778" y1="28444" x2="49778" y2="28444"/>
+                          <a14:backgroundMark x1="48444" y1="28000" x2="47556" y2="28000"/>
+                          <a14:backgroundMark x1="46222" y1="27556" x2="46222" y2="27556"/>
+                          <a14:backgroundMark x1="46222" y1="27111" x2="46222" y2="27111"/>
+                          <a14:backgroundMark x1="46667" y1="27111" x2="46667" y2="27111"/>
+                          <a14:backgroundMark x1="46667" y1="27111" x2="46667" y2="27111"/>
+                          <a14:backgroundMark x1="57333" y1="28889" x2="57333" y2="28889"/>
+                          <a14:backgroundMark x1="57333" y1="28444" x2="57333" y2="28444"/>
+                          <a14:backgroundMark x1="58222" y1="28444" x2="58222" y2="28444"/>
+                          <a14:backgroundMark x1="54667" y1="29333" x2="54667" y2="29333"/>
+                          <a14:backgroundMark x1="54667" y1="31111" x2="54667" y2="31111"/>
+                          <a14:backgroundMark x1="54667" y1="31111" x2="54667" y2="31111"/>
+                          <a14:backgroundMark x1="53778" y1="29778" x2="53778" y2="29778"/>
+                          <a14:backgroundMark x1="55556" y1="30222" x2="55556" y2="30222"/>
+                          <a14:backgroundMark x1="55556" y1="30222" x2="55556" y2="30222"/>
+                          <a14:backgroundMark x1="54667" y1="30222" x2="54667" y2="30222"/>
+                          <a14:backgroundMark x1="53778" y1="28444" x2="53778" y2="28444"/>
+                          <a14:backgroundMark x1="54667" y1="30222" x2="54667" y2="30222"/>
+                          <a14:backgroundMark x1="55111" y1="30222" x2="55111" y2="30222"/>
+                          <a14:backgroundMark x1="53778" y1="29778" x2="53778" y2="29778"/>
+                          <a14:backgroundMark x1="58222" y1="30667" x2="58222" y2="30667"/>
+                          <a14:backgroundMark x1="54222" y1="29333" x2="54222" y2="29333"/>
+                          <a14:backgroundMark x1="52444" y1="52444" x2="52444" y2="52444"/>
+                          <a14:backgroundMark x1="75111" y1="52889" x2="75111" y2="52889"/>
+                          <a14:backgroundMark x1="78667" y1="52000" x2="81333" y2="52000"/>
+                          <a14:backgroundMark x1="78667" y1="52889" x2="83111" y2="52000"/>
+                          <a14:backgroundMark x1="84444" y1="52000" x2="84444" y2="52000"/>
+                          <a14:backgroundMark x1="87556" y1="52444" x2="87556" y2="52444"/>
+                          <a14:backgroundMark x1="87556" y1="51111" x2="87556" y2="51111"/>
+                          <a14:backgroundMark x1="88000" y1="52889" x2="88000" y2="52889"/>
+                          <a14:backgroundMark x1="88000" y1="52889" x2="88000" y2="52889"/>
+                          <a14:backgroundMark x1="88000" y1="53333" x2="88000" y2="53333"/>
+                          <a14:backgroundMark x1="87556" y1="54667" x2="87556" y2="54667"/>
+                          <a14:backgroundMark x1="87111" y1="53778" x2="85778" y2="52000"/>
+                          <a14:backgroundMark x1="87111" y1="53778" x2="88889" y2="53778"/>
+                          <a14:backgroundMark x1="88444" y1="52444" x2="86667" y2="55111"/>
+                          <a14:backgroundMark x1="88889" y1="55111" x2="88889" y2="55111"/>
+                          <a14:backgroundMark x1="85778" y1="52444" x2="77333" y2="50667"/>
+                          <a14:backgroundMark x1="79111" y1="52000" x2="74667" y2="50667"/>
+                          <a14:backgroundMark x1="77778" y1="52000" x2="73778" y2="50667"/>
+                          <a14:backgroundMark x1="72444" y1="48444" x2="72444" y2="48444"/>
+                          <a14:backgroundMark x1="72444" y1="49778" x2="72444" y2="49778"/>
+                          <a14:backgroundMark x1="72444" y1="49778" x2="72444" y2="49778"/>
+                          <a14:backgroundMark x1="73778" y1="51111" x2="71556" y2="48889"/>
+                          <a14:backgroundMark x1="12889" y1="91111" x2="12889" y2="91111"/>
+                          <a14:backgroundMark x1="12444" y1="91111" x2="13778" y2="90222"/>
+                          <a14:backgroundMark x1="16444" y1="90667" x2="12889" y2="91111"/>
+                          <a14:backgroundMark x1="12444" y1="91111" x2="10667" y2="90222"/>
+                          <a14:backgroundMark x1="15556" y1="91111" x2="12444" y2="90222"/>
+                          <a14:backgroundMark x1="12444" y1="91111" x2="10667" y2="89778"/>
+                          <a14:backgroundMark x1="10222" y1="91111" x2="10222" y2="91111"/>
+                          <a14:backgroundMark x1="11111" y1="91111" x2="11111" y2="91111"/>
+                        </a14:backgroundRemoval>
+                      </a14:imgEffect>
+                    </a14:imgLayer>
+                  </a14:imgProps>
+                </a:ext>
+                <a:ext uri="{28A0092B-C50C-407E-A947-70E740481C1C}">
+                  <a14:useLocalDpi xmlns:a14="http://schemas.microsoft.com/office/drawing/2010/main" val="0"/>
+                </a:ext>
+              </a:extLst>
+            </a:blip>
+            <a:srcRect/>
+            <a:stretch>
+              <a:fillRect/>
+            </a:stretch>
+          </p:blipFill>
+          <p:spPr bwMode="auto">
+            <a:xfrm>
+              <a:off x="407940" y="4507773"/>
+              <a:ext cx="218724" cy="218724"/>
+            </a:xfrm>
+            <a:prstGeom prst="rect">
+              <a:avLst/>
+            </a:prstGeom>
+            <a:noFill/>
+            <a:extLst>
+              <a:ext uri="{909E8E84-426E-40DD-AFC4-6F175D3DCCD1}">
+                <a14:hiddenFill xmlns:a14="http://schemas.microsoft.com/office/drawing/2010/main">
+                  <a:solidFill>
+                    <a:srgbClr val="FFFFFF"/>
+                  </a:solidFill>
+                </a14:hiddenFill>
+              </a:ext>
+            </a:extLst>
+          </p:spPr>
+        </p:pic>
+      </p:grpSp>
+      <p:grpSp>
+        <p:nvGrpSpPr>
+          <p:cNvPr id="74" name="Groupe 73">
+            <a:extLst>
+              <a:ext uri="{FF2B5EF4-FFF2-40B4-BE49-F238E27FC236}">
+                <a16:creationId xmlns:a16="http://schemas.microsoft.com/office/drawing/2014/main" id="{15A2FBAC-C13F-4CD8-8739-E7D92BE76834}"/>
+              </a:ext>
+            </a:extLst>
+          </p:cNvPr>
+          <p:cNvGrpSpPr/>
+          <p:nvPr/>
+        </p:nvGrpSpPr>
+        <p:grpSpPr>
+          <a:xfrm>
+            <a:off x="784546" y="4437229"/>
+            <a:ext cx="360000" cy="360000"/>
+            <a:chOff x="784546" y="4437229"/>
+            <a:chExt cx="360000" cy="360000"/>
+          </a:xfrm>
+        </p:grpSpPr>
+        <p:sp>
+          <p:nvSpPr>
+            <p:cNvPr id="54" name="Rectangle : coins arrondis 53">
+              <a:extLst>
+                <a:ext uri="{FF2B5EF4-FFF2-40B4-BE49-F238E27FC236}">
+                  <a16:creationId xmlns:a16="http://schemas.microsoft.com/office/drawing/2014/main" id="{F4A675CA-2EB2-47B5-9709-A81D8DCABB25}"/>
+                </a:ext>
+              </a:extLst>
+            </p:cNvPr>
+            <p:cNvSpPr/>
+            <p:nvPr/>
+          </p:nvSpPr>
+          <p:spPr>
+            <a:xfrm>
+              <a:off x="784546" y="4437229"/>
+              <a:ext cx="360000" cy="360000"/>
+            </a:xfrm>
+            <a:prstGeom prst="roundRect">
+              <a:avLst/>
+            </a:prstGeom>
+            <a:ln w="57150"/>
+            <a:effectLst/>
+            <a:scene3d>
+              <a:camera prst="orthographicFront"/>
+              <a:lightRig rig="threePt" dir="t"/>
+            </a:scene3d>
+            <a:sp3d>
+              <a:bevelT w="101600" h="101600" prst="relaxedInset"/>
+            </a:sp3d>
+          </p:spPr>
+          <p:style>
+            <a:lnRef idx="2">
+              <a:schemeClr val="accent1">
+                <a:shade val="50000"/>
+              </a:schemeClr>
+            </a:lnRef>
+            <a:fillRef idx="1">
+              <a:schemeClr val="accent1"/>
+            </a:fillRef>
+            <a:effectRef idx="0">
+              <a:schemeClr val="accent1"/>
+            </a:effectRef>
+            <a:fontRef idx="minor">
+              <a:schemeClr val="lt1"/>
+            </a:fontRef>
+          </p:style>
+          <p:txBody>
+            <a:bodyPr rtlCol="0" anchor="ctr"/>
+            <a:lstStyle/>
+            <a:p>
+              <a:pPr algn="ctr"/>
+              <a:endParaRPr lang="fr-FR" dirty="0"/>
+            </a:p>
+          </p:txBody>
+        </p:sp>
+        <p:pic>
+          <p:nvPicPr>
+            <p:cNvPr id="64" name="Picture 2" descr="changa picto">
+              <a:extLst>
+                <a:ext uri="{FF2B5EF4-FFF2-40B4-BE49-F238E27FC236}">
+                  <a16:creationId xmlns:a16="http://schemas.microsoft.com/office/drawing/2014/main" id="{ED8BF5FE-E749-4090-92E7-2B8A6FA1842F}"/>
+                </a:ext>
+              </a:extLst>
+            </p:cNvPr>
+            <p:cNvPicPr>
+              <a:picLocks noChangeAspect="1" noChangeArrowheads="1"/>
+            </p:cNvPicPr>
+            <p:nvPr/>
+          </p:nvPicPr>
+          <p:blipFill>
+            <a:blip r:embed="rId8">
+              <a:extLst>
+                <a:ext uri="{BEBA8EAE-BF5A-486C-A8C5-ECC9F3942E4B}">
+                  <a14:imgProps xmlns:a14="http://schemas.microsoft.com/office/drawing/2010/main">
+                    <a14:imgLayer r:embed="rId9">
+                      <a14:imgEffect>
+                        <a14:backgroundRemoval t="2667" b="99556" l="0" r="97778">
+                          <a14:foregroundMark x1="57920" y1="31111" x2="83556" y2="41333"/>
+                          <a14:foregroundMark x1="56807" y1="30667" x2="57920" y2="31111"/>
+                          <a14:foregroundMark x1="55691" y1="30222" x2="56807" y2="30667"/>
+                          <a14:foregroundMark x1="54578" y1="29778" x2="55691" y2="30222"/>
+                          <a14:foregroundMark x1="53462" y1="29333" x2="54578" y2="29778"/>
+                          <a14:foregroundMark x1="52348" y1="28889" x2="53462" y2="29333"/>
+                          <a14:foregroundMark x1="51275" y1="28461" x2="52348" y2="28889"/>
+                          <a14:foregroundMark x1="50119" y1="28000" x2="51241" y2="28448"/>
+                          <a14:foregroundMark x1="49006" y1="27556" x2="50119" y2="28000"/>
+                          <a14:foregroundMark x1="45683" y1="26231" x2="46683" y2="26630"/>
+                          <a14:foregroundMark x1="11111" y1="12444" x2="17043" y2="14810"/>
+                          <a14:foregroundMark x1="83556" y1="41333" x2="26222" y2="32889"/>
+                          <a14:foregroundMark x1="41333" y1="37333" x2="17778" y2="38222"/>
+                          <a14:foregroundMark x1="45333" y1="45333" x2="22667" y2="43111"/>
+                          <a14:foregroundMark x1="45333" y1="42222" x2="17778" y2="39111"/>
+                          <a14:foregroundMark x1="28444" y1="42667" x2="12444" y2="20889"/>
+                          <a14:foregroundMark x1="14667" y1="44889" x2="5778" y2="22667"/>
+                          <a14:foregroundMark x1="7556" y1="12000" x2="2667" y2="20889"/>
+                          <a14:foregroundMark x1="6222" y1="19111" x2="2667" y2="20444"/>
+                          <a14:foregroundMark x1="11556" y1="12000" x2="0" y2="2667"/>
+                          <a14:foregroundMark x1="7111" y1="10222" x2="15556" y2="4444"/>
+                          <a14:foregroundMark x1="8000" y1="24444" x2="4000" y2="46222"/>
+                          <a14:foregroundMark x1="4000" y1="40000" x2="4889" y2="57333"/>
+                          <a14:foregroundMark x1="5333" y1="48000" x2="6667" y2="73333"/>
+                          <a14:foregroundMark x1="4444" y1="55556" x2="5333" y2="85778"/>
+                          <a14:foregroundMark x1="4083" y1="91111" x2="4000" y2="97333"/>
+                          <a14:foregroundMark x1="4444" y1="64000" x2="4083" y2="91111"/>
+                          <a14:foregroundMark x1="9608" y1="97743" x2="32444" y2="99556"/>
+                          <a14:foregroundMark x1="4444" y1="97333" x2="9381" y2="97725"/>
+                          <a14:foregroundMark x1="17108" y1="91627" x2="61333" y2="97333"/>
+                          <a14:foregroundMark x1="12399" y1="91019" x2="12482" y2="91030"/>
+                          <a14:foregroundMark x1="6222" y1="90222" x2="10968" y2="90835"/>
+                          <a14:foregroundMark x1="18359" y1="93436" x2="87556" y2="96444"/>
+                          <a14:foregroundMark x1="58222" y1="96444" x2="91556" y2="94222"/>
+                          <a14:foregroundMark x1="92889" y1="96889" x2="95556" y2="99556"/>
+                          <a14:foregroundMark x1="91111" y1="98667" x2="96444" y2="66222"/>
+                          <a14:foregroundMark x1="94222" y1="97778" x2="96889" y2="68444"/>
+                          <a14:foregroundMark x1="94742" y1="51111" x2="94222" y2="34222"/>
+                          <a14:foregroundMark x1="94783" y1="52444" x2="94742" y2="51111"/>
+                          <a14:foregroundMark x1="94797" y1="52889" x2="94783" y2="52444"/>
+                          <a14:foregroundMark x1="94811" y1="53333" x2="94797" y2="52889"/>
+                          <a14:foregroundMark x1="94852" y1="54667" x2="94811" y2="53333"/>
+                          <a14:foregroundMark x1="94866" y1="55111" x2="94852" y2="54667"/>
+                          <a14:foregroundMark x1="94900" y1="56240" x2="94866" y2="55111"/>
+                          <a14:foregroundMark x1="96000" y1="92000" x2="94904" y2="56361"/>
+                          <a14:foregroundMark x1="71189" y1="48025" x2="60000" y2="44444"/>
+                          <a14:foregroundMark x1="93333" y1="55111" x2="92557" y2="54863"/>
+                          <a14:foregroundMark x1="88889" y1="47556" x2="85946" y2="46986"/>
+                          <a14:foregroundMark x1="97778" y1="48444" x2="80889" y2="20889"/>
+                          <a14:foregroundMark x1="67556" y1="39111" x2="79111" y2="32444"/>
+                          <a14:foregroundMark x1="66222" y1="37333" x2="75111" y2="18222"/>
+                          <a14:foregroundMark x1="79111" y1="33333" x2="73778" y2="5778"/>
+                          <a14:foregroundMark x1="73778" y1="20889" x2="76889" y2="4889"/>
+                          <a14:foregroundMark x1="90667" y1="33778" x2="89778" y2="16889"/>
+                          <a14:foregroundMark x1="95556" y1="32889" x2="95111" y2="20889"/>
+                          <a14:foregroundMark x1="93778" y1="22222" x2="79111" y2="4444"/>
+                          <a14:foregroundMark x1="56889" y1="10667" x2="56889" y2="22222"/>
+                          <a14:foregroundMark x1="56889" y1="20889" x2="54667" y2="15556"/>
+                          <a14:foregroundMark x1="57778" y1="27556" x2="56000" y2="8000"/>
+                          <a14:foregroundMark x1="23111" y1="60444" x2="27111" y2="60000"/>
+                          <a14:foregroundMark x1="32444" y1="60444" x2="32444" y2="60444"/>
+                          <a14:foregroundMark x1="41778" y1="59111" x2="41778" y2="59111"/>
+                          <a14:foregroundMark x1="48000" y1="59111" x2="48000" y2="59111"/>
+                          <a14:foregroundMark x1="51556" y1="60000" x2="51556" y2="60000"/>
+                          <a14:foregroundMark x1="56889" y1="60444" x2="56889" y2="60444"/>
+                          <a14:foregroundMark x1="60889" y1="60444" x2="60889" y2="60444"/>
+                          <a14:foregroundMark x1="66667" y1="60444" x2="68444" y2="60000"/>
+                          <a14:foregroundMark x1="72000" y1="59556" x2="72000" y2="59556"/>
+                          <a14:foregroundMark x1="75457" y1="58565" x2="15556" y2="56889"/>
+                          <a14:foregroundMark x1="65333" y1="60444" x2="83131" y2="60031"/>
+                          <a14:foregroundMark x1="18667" y1="69333" x2="79111" y2="69778"/>
+                          <a14:foregroundMark x1="82222" y1="71111" x2="82222" y2="71111"/>
+                          <a14:foregroundMark x1="45778" y1="80000" x2="45778" y2="80000"/>
+                          <a14:foregroundMark x1="32000" y1="81778" x2="48444" y2="81778"/>
+                          <a14:foregroundMark x1="58222" y1="83111" x2="65778" y2="83111"/>
+                          <a14:foregroundMark x1="71111" y1="82667" x2="71111" y2="82667"/>
+                          <a14:foregroundMark x1="25333" y1="81333" x2="19111" y2="80889"/>
+                          <a14:backgroundMark x1="35301" y1="14363" x2="38222" y2="9333"/>
+                          <a14:backgroundMark x1="28000" y1="28444" x2="28000" y2="28444"/>
+                          <a14:backgroundMark x1="27111" y1="23556" x2="33333" y2="26222"/>
+                          <a14:backgroundMark x1="22222" y1="21778" x2="22222" y2="19556"/>
+                          <a14:backgroundMark x1="25778" y1="20444" x2="31556" y2="17778"/>
+                          <a14:backgroundMark x1="24444" y1="16444" x2="23111" y2="20889"/>
+                          <a14:backgroundMark x1="36444" y1="23111" x2="40000" y2="23111"/>
+                          <a14:backgroundMark x1="42667" y1="27556" x2="44000" y2="27556"/>
+                          <a14:backgroundMark x1="39111" y1="24889" x2="39111" y2="24889"/>
+                          <a14:backgroundMark x1="37333" y1="21778" x2="37333" y2="21778"/>
+                          <a14:backgroundMark x1="36889" y1="23556" x2="39111" y2="19556"/>
+                          <a14:backgroundMark x1="37778" y1="23111" x2="33778" y2="20889"/>
+                          <a14:backgroundMark x1="40889" y1="21778" x2="39111" y2="22222"/>
+                          <a14:backgroundMark x1="42222" y1="25333" x2="42222" y2="25333"/>
+                          <a14:backgroundMark x1="40889" y1="24000" x2="40889" y2="24000"/>
+                          <a14:backgroundMark x1="40000" y1="24889" x2="40000" y2="24889"/>
+                          <a14:backgroundMark x1="37778" y1="24000" x2="37778" y2="24000"/>
+                          <a14:backgroundMark x1="40444" y1="24000" x2="40444" y2="24000"/>
+                          <a14:backgroundMark x1="40444" y1="23111" x2="39111" y2="24889"/>
+                          <a14:backgroundMark x1="44000" y1="26222" x2="45333" y2="26667"/>
+                          <a14:backgroundMark x1="47111" y1="27556" x2="47111" y2="27556"/>
+                          <a14:backgroundMark x1="48000" y1="28000" x2="48000" y2="28000"/>
+                          <a14:backgroundMark x1="48444" y1="28000" x2="48444" y2="28000"/>
+                          <a14:backgroundMark x1="50667" y1="28000" x2="50667" y2="28000"/>
+                          <a14:backgroundMark x1="51111" y1="30222" x2="51111" y2="30222"/>
+                          <a14:backgroundMark x1="48889" y1="29333" x2="48889" y2="29333"/>
+                          <a14:backgroundMark x1="54667" y1="29333" x2="54667" y2="29333"/>
+                          <a14:backgroundMark x1="56444" y1="29778" x2="56444" y2="29778"/>
+                          <a14:backgroundMark x1="57333" y1="30222" x2="57333" y2="30222"/>
+                          <a14:backgroundMark x1="53778" y1="30667" x2="53778" y2="30667"/>
+                          <a14:backgroundMark x1="51556" y1="30667" x2="51556" y2="30667"/>
+                          <a14:backgroundMark x1="52889" y1="30222" x2="52889" y2="30222"/>
+                          <a14:backgroundMark x1="52889" y1="29333" x2="52889" y2="29333"/>
+                          <a14:backgroundMark x1="52889" y1="29333" x2="52889" y2="29333"/>
+                          <a14:backgroundMark x1="52444" y1="27556" x2="52444" y2="27556"/>
+                          <a14:backgroundMark x1="51111" y1="29333" x2="51111" y2="29333"/>
+                          <a14:backgroundMark x1="51556" y1="29333" x2="51111" y2="28000"/>
+                          <a14:backgroundMark x1="48000" y1="27556" x2="48000" y2="27556"/>
+                          <a14:backgroundMark x1="46222" y1="27556" x2="46222" y2="27556"/>
+                          <a14:backgroundMark x1="46222" y1="26222" x2="46222" y2="26222"/>
+                          <a14:backgroundMark x1="46667" y1="26222" x2="46667" y2="26222"/>
+                          <a14:backgroundMark x1="48000" y1="26667" x2="48889" y2="27111"/>
+                          <a14:backgroundMark x1="49333" y1="27556" x2="49333" y2="27556"/>
+                          <a14:backgroundMark x1="48444" y1="28000" x2="48444" y2="28000"/>
+                          <a14:backgroundMark x1="47556" y1="28000" x2="47556" y2="28000"/>
+                          <a14:backgroundMark x1="45778" y1="27111" x2="45778" y2="27111"/>
+                          <a14:backgroundMark x1="47556" y1="27556" x2="48889" y2="27556"/>
+                          <a14:backgroundMark x1="49778" y1="28444" x2="49778" y2="28444"/>
+                          <a14:backgroundMark x1="48444" y1="28000" x2="47556" y2="28000"/>
+                          <a14:backgroundMark x1="46222" y1="27556" x2="46222" y2="27556"/>
+                          <a14:backgroundMark x1="46222" y1="27111" x2="46222" y2="27111"/>
+                          <a14:backgroundMark x1="46667" y1="27111" x2="46667" y2="27111"/>
+                          <a14:backgroundMark x1="46667" y1="27111" x2="46667" y2="27111"/>
+                          <a14:backgroundMark x1="57333" y1="28889" x2="57333" y2="28889"/>
+                          <a14:backgroundMark x1="57333" y1="28444" x2="57333" y2="28444"/>
+                          <a14:backgroundMark x1="58222" y1="28444" x2="58222" y2="28444"/>
+                          <a14:backgroundMark x1="54667" y1="29333" x2="54667" y2="29333"/>
+                          <a14:backgroundMark x1="54667" y1="31111" x2="54667" y2="31111"/>
+                          <a14:backgroundMark x1="54667" y1="31111" x2="54667" y2="31111"/>
+                          <a14:backgroundMark x1="53778" y1="29778" x2="53778" y2="29778"/>
+                          <a14:backgroundMark x1="55556" y1="30222" x2="55556" y2="30222"/>
+                          <a14:backgroundMark x1="55556" y1="30222" x2="55556" y2="30222"/>
+                          <a14:backgroundMark x1="54667" y1="30222" x2="54667" y2="30222"/>
+                          <a14:backgroundMark x1="53778" y1="28444" x2="53778" y2="28444"/>
+                          <a14:backgroundMark x1="54667" y1="30222" x2="54667" y2="30222"/>
+                          <a14:backgroundMark x1="55111" y1="30222" x2="55111" y2="30222"/>
+                          <a14:backgroundMark x1="53778" y1="29778" x2="53778" y2="29778"/>
+                          <a14:backgroundMark x1="58222" y1="30667" x2="58222" y2="30667"/>
+                          <a14:backgroundMark x1="54222" y1="29333" x2="54222" y2="29333"/>
+                          <a14:backgroundMark x1="52444" y1="52444" x2="52444" y2="52444"/>
+                          <a14:backgroundMark x1="75111" y1="52889" x2="75111" y2="52889"/>
+                          <a14:backgroundMark x1="78667" y1="52000" x2="81333" y2="52000"/>
+                          <a14:backgroundMark x1="78667" y1="52889" x2="83111" y2="52000"/>
+                          <a14:backgroundMark x1="84444" y1="52000" x2="84444" y2="52000"/>
+                          <a14:backgroundMark x1="87556" y1="52444" x2="87556" y2="52444"/>
+                          <a14:backgroundMark x1="87556" y1="51111" x2="87556" y2="51111"/>
+                          <a14:backgroundMark x1="88000" y1="52889" x2="88000" y2="52889"/>
+                          <a14:backgroundMark x1="88000" y1="52889" x2="88000" y2="52889"/>
+                          <a14:backgroundMark x1="88000" y1="53333" x2="88000" y2="53333"/>
+                          <a14:backgroundMark x1="87556" y1="54667" x2="87556" y2="54667"/>
+                          <a14:backgroundMark x1="87111" y1="53778" x2="85778" y2="52000"/>
+                          <a14:backgroundMark x1="87111" y1="53778" x2="88889" y2="53778"/>
+                          <a14:backgroundMark x1="88444" y1="52444" x2="86667" y2="55111"/>
+                          <a14:backgroundMark x1="88889" y1="55111" x2="88889" y2="55111"/>
+                          <a14:backgroundMark x1="85778" y1="52444" x2="77333" y2="50667"/>
+                          <a14:backgroundMark x1="79111" y1="52000" x2="74667" y2="50667"/>
+                          <a14:backgroundMark x1="77778" y1="52000" x2="73778" y2="50667"/>
+                          <a14:backgroundMark x1="72444" y1="48444" x2="72444" y2="48444"/>
+                          <a14:backgroundMark x1="72444" y1="49778" x2="72444" y2="49778"/>
+                          <a14:backgroundMark x1="72444" y1="49778" x2="72444" y2="49778"/>
+                          <a14:backgroundMark x1="73778" y1="51111" x2="71556" y2="48889"/>
+                          <a14:backgroundMark x1="12889" y1="91111" x2="12889" y2="91111"/>
+                          <a14:backgroundMark x1="12444" y1="91111" x2="13778" y2="90222"/>
+                          <a14:backgroundMark x1="16444" y1="90667" x2="12889" y2="91111"/>
+                          <a14:backgroundMark x1="12444" y1="91111" x2="10667" y2="90222"/>
+                          <a14:backgroundMark x1="15556" y1="91111" x2="12444" y2="90222"/>
+                          <a14:backgroundMark x1="12444" y1="91111" x2="10667" y2="89778"/>
+                          <a14:backgroundMark x1="10222" y1="91111" x2="10222" y2="91111"/>
+                          <a14:backgroundMark x1="11111" y1="91111" x2="11111" y2="91111"/>
+                        </a14:backgroundRemoval>
+                      </a14:imgEffect>
+                    </a14:imgLayer>
+                  </a14:imgProps>
+                </a:ext>
+                <a:ext uri="{28A0092B-C50C-407E-A947-70E740481C1C}">
+                  <a14:useLocalDpi xmlns:a14="http://schemas.microsoft.com/office/drawing/2010/main" val="0"/>
+                </a:ext>
+              </a:extLst>
+            </a:blip>
+            <a:srcRect/>
+            <a:stretch>
+              <a:fillRect/>
+            </a:stretch>
+          </p:blipFill>
+          <p:spPr bwMode="auto">
+            <a:xfrm>
+              <a:off x="855184" y="4506465"/>
+              <a:ext cx="218724" cy="218724"/>
+            </a:xfrm>
+            <a:prstGeom prst="rect">
+              <a:avLst/>
+            </a:prstGeom>
+            <a:noFill/>
+            <a:extLst>
+              <a:ext uri="{909E8E84-426E-40DD-AFC4-6F175D3DCCD1}">
+                <a14:hiddenFill xmlns:a14="http://schemas.microsoft.com/office/drawing/2010/main">
+                  <a:solidFill>
+                    <a:srgbClr val="FFFFFF"/>
+                  </a:solidFill>
+                </a14:hiddenFill>
+              </a:ext>
+            </a:extLst>
+          </p:spPr>
+        </p:pic>
+      </p:grpSp>
+      <p:grpSp>
+        <p:nvGrpSpPr>
+          <p:cNvPr id="75" name="Groupe 74">
+            <a:extLst>
+              <a:ext uri="{FF2B5EF4-FFF2-40B4-BE49-F238E27FC236}">
+                <a16:creationId xmlns:a16="http://schemas.microsoft.com/office/drawing/2014/main" id="{EC514CA4-4EB1-431E-85D2-A4F1CC9B4C6B}"/>
+              </a:ext>
+            </a:extLst>
+          </p:cNvPr>
+          <p:cNvGrpSpPr/>
+          <p:nvPr/>
+        </p:nvGrpSpPr>
+        <p:grpSpPr>
+          <a:xfrm>
+            <a:off x="342240" y="4934965"/>
+            <a:ext cx="360000" cy="360000"/>
+            <a:chOff x="342240" y="4934965"/>
+            <a:chExt cx="360000" cy="360000"/>
+          </a:xfrm>
+        </p:grpSpPr>
+        <p:sp>
+          <p:nvSpPr>
+            <p:cNvPr id="55" name="Rectangle : coins arrondis 54">
+              <a:extLst>
+                <a:ext uri="{FF2B5EF4-FFF2-40B4-BE49-F238E27FC236}">
+                  <a16:creationId xmlns:a16="http://schemas.microsoft.com/office/drawing/2014/main" id="{C0685C9E-3706-418A-8C8B-B8A53DC68297}"/>
+                </a:ext>
+              </a:extLst>
+            </p:cNvPr>
+            <p:cNvSpPr/>
+            <p:nvPr/>
+          </p:nvSpPr>
+          <p:spPr>
+            <a:xfrm>
+              <a:off x="342240" y="4934965"/>
+              <a:ext cx="360000" cy="360000"/>
+            </a:xfrm>
+            <a:prstGeom prst="roundRect">
+              <a:avLst/>
+            </a:prstGeom>
+            <a:ln w="57150"/>
+            <a:effectLst/>
+            <a:scene3d>
+              <a:camera prst="orthographicFront"/>
+              <a:lightRig rig="threePt" dir="t"/>
+            </a:scene3d>
+            <a:sp3d>
+              <a:bevelT w="101600" h="101600"/>
+            </a:sp3d>
+          </p:spPr>
+          <p:style>
+            <a:lnRef idx="2">
+              <a:schemeClr val="accent1">
+                <a:shade val="50000"/>
+              </a:schemeClr>
+            </a:lnRef>
+            <a:fillRef idx="1">
+              <a:schemeClr val="accent1"/>
+            </a:fillRef>
+            <a:effectRef idx="0">
+              <a:schemeClr val="accent1"/>
+            </a:effectRef>
+            <a:fontRef idx="minor">
+              <a:schemeClr val="lt1"/>
+            </a:fontRef>
+          </p:style>
+          <p:txBody>
+            <a:bodyPr rtlCol="0" anchor="ctr"/>
+            <a:lstStyle/>
+            <a:p>
+              <a:pPr algn="ctr"/>
+              <a:endParaRPr lang="fr-FR"/>
+            </a:p>
+          </p:txBody>
+        </p:sp>
+        <p:sp>
+          <p:nvSpPr>
+            <p:cNvPr id="63" name="Triangle isocèle 62">
+              <a:extLst>
+                <a:ext uri="{FF2B5EF4-FFF2-40B4-BE49-F238E27FC236}">
+                  <a16:creationId xmlns:a16="http://schemas.microsoft.com/office/drawing/2014/main" id="{A9A3FB4E-7F28-4E9E-9468-F661068604ED}"/>
+                </a:ext>
+              </a:extLst>
+            </p:cNvPr>
+            <p:cNvSpPr/>
+            <p:nvPr/>
+          </p:nvSpPr>
+          <p:spPr>
+            <a:xfrm>
+              <a:off x="435456" y="5017333"/>
+              <a:ext cx="163692" cy="195263"/>
+            </a:xfrm>
+            <a:prstGeom prst="triangle">
+              <a:avLst/>
+            </a:prstGeom>
+          </p:spPr>
+          <p:style>
+            <a:lnRef idx="2">
+              <a:schemeClr val="dk1">
+                <a:shade val="50000"/>
+              </a:schemeClr>
+            </a:lnRef>
+            <a:fillRef idx="1">
+              <a:schemeClr val="dk1"/>
+            </a:fillRef>
+            <a:effectRef idx="0">
+              <a:schemeClr val="dk1"/>
+            </a:effectRef>
+            <a:fontRef idx="minor">
+              <a:schemeClr val="lt1"/>
+            </a:fontRef>
+          </p:style>
+          <p:txBody>
+            <a:bodyPr rtlCol="0" anchor="ctr"/>
+            <a:lstStyle/>
+            <a:p>
+              <a:pPr algn="ctr"/>
+              <a:endParaRPr lang="fr-FR"/>
+            </a:p>
+          </p:txBody>
+        </p:sp>
+      </p:grpSp>
+      <p:grpSp>
+        <p:nvGrpSpPr>
+          <p:cNvPr id="76" name="Groupe 75">
+            <a:extLst>
+              <a:ext uri="{FF2B5EF4-FFF2-40B4-BE49-F238E27FC236}">
+                <a16:creationId xmlns:a16="http://schemas.microsoft.com/office/drawing/2014/main" id="{CF4777D3-78BE-4D86-A8B7-7BC49E262784}"/>
+              </a:ext>
+            </a:extLst>
+          </p:cNvPr>
+          <p:cNvGrpSpPr/>
+          <p:nvPr/>
+        </p:nvGrpSpPr>
+        <p:grpSpPr>
+          <a:xfrm>
+            <a:off x="784546" y="4935059"/>
+            <a:ext cx="360000" cy="360000"/>
+            <a:chOff x="784546" y="4935059"/>
+            <a:chExt cx="360000" cy="360000"/>
+          </a:xfrm>
+        </p:grpSpPr>
+        <p:sp>
+          <p:nvSpPr>
+            <p:cNvPr id="56" name="Rectangle : coins arrondis 55">
+              <a:extLst>
+                <a:ext uri="{FF2B5EF4-FFF2-40B4-BE49-F238E27FC236}">
+                  <a16:creationId xmlns:a16="http://schemas.microsoft.com/office/drawing/2014/main" id="{BB445E81-1A68-4478-B381-8F8908971415}"/>
+                </a:ext>
+              </a:extLst>
+            </p:cNvPr>
+            <p:cNvSpPr/>
+            <p:nvPr/>
+          </p:nvSpPr>
+          <p:spPr>
+            <a:xfrm>
+              <a:off x="784546" y="4935059"/>
+              <a:ext cx="360000" cy="360000"/>
+            </a:xfrm>
+            <a:prstGeom prst="roundRect">
+              <a:avLst/>
+            </a:prstGeom>
+            <a:ln w="57150"/>
+            <a:effectLst/>
+            <a:scene3d>
+              <a:camera prst="orthographicFront"/>
+              <a:lightRig rig="threePt" dir="t"/>
+            </a:scene3d>
+            <a:sp3d>
+              <a:bevelT w="101600" h="101600" prst="relaxedInset"/>
+            </a:sp3d>
+          </p:spPr>
+          <p:style>
+            <a:lnRef idx="2">
+              <a:schemeClr val="accent1">
+                <a:shade val="50000"/>
+              </a:schemeClr>
+            </a:lnRef>
+            <a:fillRef idx="1">
+              <a:schemeClr val="accent1"/>
+            </a:fillRef>
+            <a:effectRef idx="0">
+              <a:schemeClr val="accent1"/>
+            </a:effectRef>
+            <a:fontRef idx="minor">
+              <a:schemeClr val="lt1"/>
+            </a:fontRef>
+          </p:style>
+          <p:txBody>
+            <a:bodyPr rtlCol="0" anchor="ctr"/>
+            <a:lstStyle/>
+            <a:p>
+              <a:pPr algn="ctr"/>
+              <a:endParaRPr lang="fr-FR" dirty="0"/>
+            </a:p>
+          </p:txBody>
+        </p:sp>
+        <p:sp>
+          <p:nvSpPr>
+            <p:cNvPr id="67" name="Triangle isocèle 66">
+              <a:extLst>
+                <a:ext uri="{FF2B5EF4-FFF2-40B4-BE49-F238E27FC236}">
+                  <a16:creationId xmlns:a16="http://schemas.microsoft.com/office/drawing/2014/main" id="{A48A388D-D32B-440C-9D4E-86B5B6482217}"/>
+                </a:ext>
+              </a:extLst>
+            </p:cNvPr>
+            <p:cNvSpPr/>
+            <p:nvPr/>
+          </p:nvSpPr>
+          <p:spPr>
+            <a:xfrm>
+              <a:off x="882700" y="5018732"/>
+              <a:ext cx="163692" cy="195263"/>
+            </a:xfrm>
+            <a:prstGeom prst="triangle">
+              <a:avLst/>
+            </a:prstGeom>
+          </p:spPr>
+          <p:style>
+            <a:lnRef idx="2">
+              <a:schemeClr val="dk1">
+                <a:shade val="50000"/>
+              </a:schemeClr>
+            </a:lnRef>
+            <a:fillRef idx="1">
+              <a:schemeClr val="dk1"/>
+            </a:fillRef>
+            <a:effectRef idx="0">
+              <a:schemeClr val="dk1"/>
+            </a:effectRef>
+            <a:fontRef idx="minor">
+              <a:schemeClr val="lt1"/>
+            </a:fontRef>
+          </p:style>
+          <p:txBody>
+            <a:bodyPr rtlCol="0" anchor="ctr"/>
+            <a:lstStyle/>
+            <a:p>
+              <a:pPr algn="ctr"/>
+              <a:endParaRPr lang="fr-FR"/>
+            </a:p>
+          </p:txBody>
+        </p:sp>
+      </p:grpSp>
+      <p:grpSp>
+        <p:nvGrpSpPr>
+          <p:cNvPr id="77" name="Groupe 76">
+            <a:extLst>
+              <a:ext uri="{FF2B5EF4-FFF2-40B4-BE49-F238E27FC236}">
+                <a16:creationId xmlns:a16="http://schemas.microsoft.com/office/drawing/2014/main" id="{2B8EDA0A-F259-4BED-B558-D15CFD6CA286}"/>
+              </a:ext>
+            </a:extLst>
+          </p:cNvPr>
+          <p:cNvGrpSpPr/>
+          <p:nvPr/>
+        </p:nvGrpSpPr>
+        <p:grpSpPr>
+          <a:xfrm>
+            <a:off x="342240" y="5447271"/>
+            <a:ext cx="360000" cy="360000"/>
+            <a:chOff x="342240" y="5447271"/>
+            <a:chExt cx="360000" cy="360000"/>
+          </a:xfrm>
+        </p:grpSpPr>
+        <p:sp>
+          <p:nvSpPr>
+            <p:cNvPr id="57" name="Rectangle : coins arrondis 56">
+              <a:extLst>
+                <a:ext uri="{FF2B5EF4-FFF2-40B4-BE49-F238E27FC236}">
+                  <a16:creationId xmlns:a16="http://schemas.microsoft.com/office/drawing/2014/main" id="{6A128AD8-7C78-4C49-9A30-0AF198B50C78}"/>
+                </a:ext>
+              </a:extLst>
+            </p:cNvPr>
+            <p:cNvSpPr/>
+            <p:nvPr/>
+          </p:nvSpPr>
+          <p:spPr>
+            <a:xfrm>
+              <a:off x="342240" y="5447271"/>
+              <a:ext cx="360000" cy="360000"/>
+            </a:xfrm>
+            <a:prstGeom prst="roundRect">
+              <a:avLst/>
+            </a:prstGeom>
+            <a:ln w="57150"/>
+            <a:effectLst/>
+            <a:scene3d>
+              <a:camera prst="orthographicFront"/>
+              <a:lightRig rig="threePt" dir="t"/>
+            </a:scene3d>
+            <a:sp3d>
+              <a:bevelT w="101600" h="101600"/>
+            </a:sp3d>
+          </p:spPr>
+          <p:style>
+            <a:lnRef idx="2">
+              <a:schemeClr val="accent1">
+                <a:shade val="50000"/>
+              </a:schemeClr>
+            </a:lnRef>
+            <a:fillRef idx="1">
+              <a:schemeClr val="accent1"/>
+            </a:fillRef>
+            <a:effectRef idx="0">
+              <a:schemeClr val="accent1"/>
+            </a:effectRef>
+            <a:fontRef idx="minor">
+              <a:schemeClr val="lt1"/>
+            </a:fontRef>
+          </p:style>
+          <p:txBody>
+            <a:bodyPr rtlCol="0" anchor="ctr"/>
+            <a:lstStyle/>
+            <a:p>
+              <a:pPr algn="ctr"/>
+              <a:endParaRPr lang="fr-FR"/>
+            </a:p>
+          </p:txBody>
+        </p:sp>
+        <p:sp>
+          <p:nvSpPr>
+            <p:cNvPr id="68" name="Triangle isocèle 67">
+              <a:extLst>
+                <a:ext uri="{FF2B5EF4-FFF2-40B4-BE49-F238E27FC236}">
+                  <a16:creationId xmlns:a16="http://schemas.microsoft.com/office/drawing/2014/main" id="{C2C408E6-BEDE-49BB-9962-913EA4BB61D5}"/>
+                </a:ext>
+              </a:extLst>
+            </p:cNvPr>
+            <p:cNvSpPr/>
+            <p:nvPr/>
+          </p:nvSpPr>
+          <p:spPr>
+            <a:xfrm rot="10800000">
+              <a:off x="435456" y="5529639"/>
+              <a:ext cx="163692" cy="195263"/>
+            </a:xfrm>
+            <a:prstGeom prst="triangle">
+              <a:avLst/>
+            </a:prstGeom>
+          </p:spPr>
+          <p:style>
+            <a:lnRef idx="2">
+              <a:schemeClr val="dk1">
+                <a:shade val="50000"/>
+              </a:schemeClr>
+            </a:lnRef>
+            <a:fillRef idx="1">
+              <a:schemeClr val="dk1"/>
+            </a:fillRef>
+            <a:effectRef idx="0">
+              <a:schemeClr val="dk1"/>
+            </a:effectRef>
+            <a:fontRef idx="minor">
+              <a:schemeClr val="lt1"/>
+            </a:fontRef>
+          </p:style>
+          <p:txBody>
+            <a:bodyPr rtlCol="0" anchor="ctr"/>
+            <a:lstStyle/>
+            <a:p>
+              <a:pPr algn="ctr"/>
+              <a:endParaRPr lang="fr-FR"/>
+            </a:p>
+          </p:txBody>
+        </p:sp>
+      </p:grpSp>
+      <p:grpSp>
+        <p:nvGrpSpPr>
+          <p:cNvPr id="78" name="Groupe 77">
+            <a:extLst>
+              <a:ext uri="{FF2B5EF4-FFF2-40B4-BE49-F238E27FC236}">
+                <a16:creationId xmlns:a16="http://schemas.microsoft.com/office/drawing/2014/main" id="{C23EB250-EB9A-495E-B8A1-0D5F40398B12}"/>
+              </a:ext>
+            </a:extLst>
+          </p:cNvPr>
+          <p:cNvGrpSpPr/>
+          <p:nvPr/>
+        </p:nvGrpSpPr>
+        <p:grpSpPr>
+          <a:xfrm>
+            <a:off x="784546" y="5447365"/>
+            <a:ext cx="360000" cy="360000"/>
+            <a:chOff x="784546" y="5447365"/>
+            <a:chExt cx="360000" cy="360000"/>
+          </a:xfrm>
+        </p:grpSpPr>
+        <p:sp>
+          <p:nvSpPr>
+            <p:cNvPr id="58" name="Rectangle : coins arrondis 57">
+              <a:extLst>
+                <a:ext uri="{FF2B5EF4-FFF2-40B4-BE49-F238E27FC236}">
+                  <a16:creationId xmlns:a16="http://schemas.microsoft.com/office/drawing/2014/main" id="{3DCBF52F-5614-42B8-B7A1-8EF919FD9EF3}"/>
+                </a:ext>
+              </a:extLst>
+            </p:cNvPr>
+            <p:cNvSpPr/>
+            <p:nvPr/>
+          </p:nvSpPr>
+          <p:spPr>
+            <a:xfrm>
+              <a:off x="784546" y="5447365"/>
+              <a:ext cx="360000" cy="360000"/>
+            </a:xfrm>
+            <a:prstGeom prst="roundRect">
+              <a:avLst/>
+            </a:prstGeom>
+            <a:ln w="57150"/>
+            <a:effectLst/>
+            <a:scene3d>
+              <a:camera prst="orthographicFront"/>
+              <a:lightRig rig="threePt" dir="t"/>
+            </a:scene3d>
+            <a:sp3d>
+              <a:bevelT w="101600" h="101600" prst="relaxedInset"/>
+            </a:sp3d>
+          </p:spPr>
+          <p:style>
+            <a:lnRef idx="2">
+              <a:schemeClr val="accent1">
+                <a:shade val="50000"/>
+              </a:schemeClr>
+            </a:lnRef>
+            <a:fillRef idx="1">
+              <a:schemeClr val="accent1"/>
+            </a:fillRef>
+            <a:effectRef idx="0">
+              <a:schemeClr val="accent1"/>
+            </a:effectRef>
+            <a:fontRef idx="minor">
+              <a:schemeClr val="lt1"/>
+            </a:fontRef>
+          </p:style>
+          <p:txBody>
+            <a:bodyPr rtlCol="0" anchor="ctr"/>
+            <a:lstStyle/>
+            <a:p>
+              <a:pPr algn="ctr"/>
+              <a:endParaRPr lang="fr-FR" dirty="0"/>
+            </a:p>
+          </p:txBody>
+        </p:sp>
+        <p:sp>
+          <p:nvSpPr>
+            <p:cNvPr id="69" name="Triangle isocèle 68">
+              <a:extLst>
+                <a:ext uri="{FF2B5EF4-FFF2-40B4-BE49-F238E27FC236}">
+                  <a16:creationId xmlns:a16="http://schemas.microsoft.com/office/drawing/2014/main" id="{DF742DA0-06E9-437F-B826-50AEC2B09544}"/>
+                </a:ext>
+              </a:extLst>
+            </p:cNvPr>
+            <p:cNvSpPr/>
+            <p:nvPr/>
+          </p:nvSpPr>
+          <p:spPr>
+            <a:xfrm rot="10800000">
+              <a:off x="882700" y="5529638"/>
+              <a:ext cx="163692" cy="195263"/>
+            </a:xfrm>
+            <a:prstGeom prst="triangle">
+              <a:avLst/>
+            </a:prstGeom>
+          </p:spPr>
+          <p:style>
+            <a:lnRef idx="2">
+              <a:schemeClr val="dk1">
+                <a:shade val="50000"/>
+              </a:schemeClr>
+            </a:lnRef>
+            <a:fillRef idx="1">
+              <a:schemeClr val="dk1"/>
+            </a:fillRef>
+            <a:effectRef idx="0">
+              <a:schemeClr val="dk1"/>
+            </a:effectRef>
+            <a:fontRef idx="minor">
+              <a:schemeClr val="lt1"/>
+            </a:fontRef>
+          </p:style>
+          <p:txBody>
+            <a:bodyPr rtlCol="0" anchor="ctr"/>
+            <a:lstStyle/>
+            <a:p>
+              <a:pPr algn="ctr"/>
+              <a:endParaRPr lang="fr-FR"/>
+            </a:p>
+          </p:txBody>
+        </p:sp>
       </p:grpSp>
     </p:spTree>
     <p:extLst>

</xml_diff>